<commit_message>
mostly working through question 7
</commit_message>
<xml_diff>
--- a/Unit 2/Richard_Palmer_LiveSession_2.pptx
+++ b/Unit 2/Richard_Palmer_LiveSession_2.pptx
@@ -11,6 +11,17 @@
     <p:sldId id="259" r:id="rId5"/>
     <p:sldId id="260" r:id="rId6"/>
     <p:sldId id="261" r:id="rId7"/>
+    <p:sldId id="262" r:id="rId8"/>
+    <p:sldId id="263" r:id="rId9"/>
+    <p:sldId id="264" r:id="rId10"/>
+    <p:sldId id="265" r:id="rId11"/>
+    <p:sldId id="266" r:id="rId12"/>
+    <p:sldId id="267" r:id="rId13"/>
+    <p:sldId id="268" r:id="rId14"/>
+    <p:sldId id="269" r:id="rId15"/>
+    <p:sldId id="270" r:id="rId16"/>
+    <p:sldId id="271" r:id="rId17"/>
+    <p:sldId id="272" r:id="rId18"/>
   </p:sldIdLst>
   <p:sldSz cx="9144000" cy="6858000" type="screen4x3"/>
   <p:notesSz cx="6858000" cy="9144000"/>
@@ -3224,7 +3235,7 @@
 </p:sld>
 </file>
 
-<file path=ppt/slides/slide2.xml><?xml version="1.0" encoding="utf-8"?>
+<file path=ppt/slides/slide10.xml><?xml version="1.0" encoding="utf-8"?>
 <p:sld xmlns:a="http://schemas.openxmlformats.org/drawingml/2006/main" xmlns:r="http://schemas.openxmlformats.org/officeDocument/2006/relationships" xmlns:p="http://schemas.openxmlformats.org/presentationml/2006/main">
   <p:cSld>
     <p:spTree>
@@ -3243,6 +3254,39 @@
       </p:grpSpPr>
       <p:sp>
         <p:nvSpPr>
+          <p:cNvPr id="2" name="Title 1"/>
+          <p:cNvSpPr>
+            <a:spLocks noGrp="1"/>
+          </p:cNvSpPr>
+          <p:nvPr>
+            <p:ph type="title"/>
+          </p:nvPr>
+        </p:nvSpPr>
+        <p:spPr/>
+        <p:txBody>
+          <a:bodyPr/>
+          <a:lstStyle/>
+          <a:p>
+            <a:pPr lvl="0" marL="0" indent="0">
+              <a:buNone/>
+            </a:pPr>
+            <a:r>
+              <a:rPr/>
+              <a:t>Question</a:t>
+            </a:r>
+            <a:r>
+              <a:rPr/>
+              <a:t> </a:t>
+            </a:r>
+            <a:r>
+              <a:rPr/>
+              <a:t>6</a:t>
+            </a:r>
+          </a:p>
+        </p:txBody>
+      </p:sp>
+      <p:sp>
+        <p:nvSpPr>
           <p:cNvPr id="3" name="Content Placeholder 2"/>
           <p:cNvSpPr>
             <a:spLocks noGrp="1"/>
@@ -3255,6 +3299,15 @@
         <p:txBody>
           <a:bodyPr/>
           <a:lstStyle/>
+          <a:p>
+            <a:pPr lvl="0" marL="0" indent="0">
+              <a:buNone/>
+            </a:pPr>
+            <a:r>
+              <a:rPr/>
+              <a:t>Is there any difference in height/weight relationship among positions?</a:t>
+            </a:r>
+          </a:p>
           <a:p>
             <a:pPr lvl="0" marL="1270000" indent="0">
               <a:buNone/>
@@ -3263,34 +3316,7 @@
               <a:rPr sz="1800">
                 <a:latin typeface="Courier"/>
               </a:rPr>
-              <a:t>## 
-## Attaching package: 'dplyr'</a:t>
-            </a:r>
-          </a:p>
-          <a:p>
-            <a:pPr lvl="0" marL="1270000" indent="0">
-              <a:buNone/>
-            </a:pPr>
-            <a:r>
-              <a:rPr sz="1800">
-                <a:latin typeface="Courier"/>
-              </a:rPr>
-              <a:t>## The following objects are masked from 'package:stats':
-## 
-##     filter, lag</a:t>
-            </a:r>
-          </a:p>
-          <a:p>
-            <a:pPr lvl="0" marL="1270000" indent="0">
-              <a:buNone/>
-            </a:pPr>
-            <a:r>
-              <a:rPr sz="1800">
-                <a:latin typeface="Courier"/>
-              </a:rPr>
-              <a:t>## The following objects are masked from 'package:base':
-## 
-##     intersect, setdiff, setequal, union</a:t>
+              <a:t>## Warning: Removed 6 rows containing missing values (geom_point).</a:t>
             </a:r>
           </a:p>
         </p:txBody>
@@ -3300,7 +3326,7 @@
 </p:sld>
 </file>
 
-<file path=ppt/slides/slide3.xml><?xml version="1.0" encoding="utf-8"?>
+<file path=ppt/slides/slide11.xml><?xml version="1.0" encoding="utf-8"?>
 <p:sld xmlns:a="http://schemas.openxmlformats.org/drawingml/2006/main" xmlns:r="http://schemas.openxmlformats.org/officeDocument/2006/relationships" xmlns:p="http://schemas.openxmlformats.org/presentationml/2006/main">
   <p:cSld>
     <p:spTree>
@@ -3317,42 +3343,9 @@
           <a:chExt cx="0" cy="0"/>
         </a:xfrm>
       </p:grpSpPr>
-      <p:sp>
-        <p:nvSpPr>
-          <p:cNvPr id="2" name="Title 1"/>
-          <p:cNvSpPr>
-            <a:spLocks noGrp="1"/>
-          </p:cNvSpPr>
-          <p:nvPr>
-            <p:ph type="title"/>
-          </p:nvPr>
-        </p:nvSpPr>
-        <p:spPr/>
-        <p:txBody>
-          <a:bodyPr/>
-          <a:lstStyle/>
-          <a:p>
-            <a:pPr lvl="0" marL="0" indent="0">
-              <a:buNone/>
-            </a:pPr>
-            <a:r>
-              <a:rPr/>
-              <a:t>Question</a:t>
-            </a:r>
-            <a:r>
-              <a:rPr/>
-              <a:t> </a:t>
-            </a:r>
-            <a:r>
-              <a:rPr/>
-              <a:t>1</a:t>
-            </a:r>
-          </a:p>
-        </p:txBody>
-      </p:sp>
       <p:pic>
         <p:nvPicPr>
-          <p:cNvPr descr="Richard_Palmer_LiveSession_2_files/figure-pptx/unnamed-chunk-2-1.png" id="0" name="Picture 1"/>
+          <p:cNvPr descr="Richard_Palmer_LiveSession_2_files/figure-pptx/unnamed-chunk-7-1.png" id="0" name="Picture 1"/>
           <p:cNvPicPr>
             <a:picLocks noGrp="1" noChangeAspect="1"/>
           </p:cNvPicPr>
@@ -3385,6 +3378,669 @@
 </p:sld>
 </file>
 
+<file path=ppt/slides/slide12.xml><?xml version="1.0" encoding="utf-8"?>
+<p:sld xmlns:a="http://schemas.openxmlformats.org/drawingml/2006/main" xmlns:r="http://schemas.openxmlformats.org/officeDocument/2006/relationships" xmlns:p="http://schemas.openxmlformats.org/presentationml/2006/main">
+  <p:cSld>
+    <p:spTree>
+      <p:nvGrpSpPr>
+        <p:cNvPr id="1" name=""/>
+        <p:cNvGrpSpPr/>
+        <p:nvPr/>
+      </p:nvGrpSpPr>
+      <p:grpSpPr>
+        <a:xfrm>
+          <a:off x="0" y="0"/>
+          <a:ext cx="0" cy="0"/>
+          <a:chOff x="0" y="0"/>
+          <a:chExt cx="0" cy="0"/>
+        </a:xfrm>
+      </p:grpSpPr>
+      <p:sp>
+        <p:nvSpPr>
+          <p:cNvPr id="2" name="Title 1"/>
+          <p:cNvSpPr>
+            <a:spLocks noGrp="1"/>
+          </p:cNvSpPr>
+          <p:nvPr>
+            <p:ph type="title"/>
+          </p:nvPr>
+        </p:nvSpPr>
+        <p:spPr/>
+        <p:txBody>
+          <a:bodyPr/>
+          <a:lstStyle/>
+          <a:p>
+            <a:pPr lvl="0" marL="0" indent="0">
+              <a:buNone/>
+            </a:pPr>
+            <a:r>
+              <a:rPr/>
+              <a:t>Question</a:t>
+            </a:r>
+            <a:r>
+              <a:rPr/>
+              <a:t> </a:t>
+            </a:r>
+            <a:r>
+              <a:rPr/>
+              <a:t>7</a:t>
+            </a:r>
+          </a:p>
+        </p:txBody>
+      </p:sp>
+      <p:sp>
+        <p:nvSpPr>
+          <p:cNvPr id="3" name="Content Placeholder 2"/>
+          <p:cNvSpPr>
+            <a:spLocks noGrp="1"/>
+          </p:cNvSpPr>
+          <p:nvPr>
+            <p:ph idx="1"/>
+          </p:nvPr>
+        </p:nvSpPr>
+        <p:spPr/>
+        <p:txBody>
+          <a:bodyPr/>
+          <a:lstStyle/>
+          <a:p>
+            <a:pPr lvl="0" marL="0" indent="0">
+              <a:buNone/>
+            </a:pPr>
+            <a:r>
+              <a:rPr/>
+              <a:t>Is there any evidence that height has changed over the years?</a:t>
+            </a:r>
+          </a:p>
+          <a:p>
+            <a:pPr lvl="0" marL="1270000" indent="0">
+              <a:buNone/>
+            </a:pPr>
+            <a:r>
+              <a:rPr sz="1800">
+                <a:latin typeface="Courier"/>
+              </a:rPr>
+              <a:t>## Warning: Removed 1 rows containing missing values (geom_point).</a:t>
+            </a:r>
+          </a:p>
+        </p:txBody>
+      </p:sp>
+    </p:spTree>
+  </p:cSld>
+</p:sld>
+</file>
+
+<file path=ppt/slides/slide13.xml><?xml version="1.0" encoding="utf-8"?>
+<p:sld xmlns:a="http://schemas.openxmlformats.org/drawingml/2006/main" xmlns:r="http://schemas.openxmlformats.org/officeDocument/2006/relationships" xmlns:p="http://schemas.openxmlformats.org/presentationml/2006/main">
+  <p:cSld>
+    <p:spTree>
+      <p:nvGrpSpPr>
+        <p:cNvPr id="1" name=""/>
+        <p:cNvGrpSpPr/>
+        <p:nvPr/>
+      </p:nvGrpSpPr>
+      <p:grpSpPr>
+        <a:xfrm>
+          <a:off x="0" y="0"/>
+          <a:ext cx="0" cy="0"/>
+          <a:chOff x="0" y="0"/>
+          <a:chExt cx="0" cy="0"/>
+        </a:xfrm>
+      </p:grpSpPr>
+      <p:pic>
+        <p:nvPicPr>
+          <p:cNvPr descr="Richard_Palmer_LiveSession_2_files/figure-pptx/unnamed-chunk-8-1.png" id="0" name="Picture 1"/>
+          <p:cNvPicPr>
+            <a:picLocks noGrp="1" noChangeAspect="1"/>
+          </p:cNvPicPr>
+          <p:nvPr/>
+        </p:nvPicPr>
+        <p:blipFill>
+          <a:blip r:embed="rId2"/>
+          <a:stretch>
+            <a:fillRect/>
+          </a:stretch>
+        </p:blipFill>
+        <p:spPr bwMode="auto">
+          <a:xfrm>
+            <a:off x="1752600" y="1600200"/>
+            <a:ext cx="5651500" cy="4521200"/>
+          </a:xfrm>
+          <a:prstGeom prst="rect">
+            <a:avLst/>
+          </a:prstGeom>
+          <a:noFill/>
+          <a:ln w="9525">
+            <a:noFill/>
+            <a:headEnd/>
+            <a:tailEnd/>
+          </a:ln>
+        </p:spPr>
+      </p:pic>
+    </p:spTree>
+  </p:cSld>
+</p:sld>
+</file>
+
+<file path=ppt/slides/slide14.xml><?xml version="1.0" encoding="utf-8"?>
+<p:sld xmlns:a="http://schemas.openxmlformats.org/drawingml/2006/main" xmlns:r="http://schemas.openxmlformats.org/officeDocument/2006/relationships" xmlns:p="http://schemas.openxmlformats.org/presentationml/2006/main">
+  <p:cSld>
+    <p:spTree>
+      <p:nvGrpSpPr>
+        <p:cNvPr id="1" name=""/>
+        <p:cNvGrpSpPr/>
+        <p:nvPr/>
+      </p:nvGrpSpPr>
+      <p:grpSpPr>
+        <a:xfrm>
+          <a:off x="0" y="0"/>
+          <a:ext cx="0" cy="0"/>
+          <a:chOff x="0" y="0"/>
+          <a:chExt cx="0" cy="0"/>
+        </a:xfrm>
+      </p:grpSpPr>
+      <p:sp>
+        <p:nvSpPr>
+          <p:cNvPr id="3" name="Content Placeholder 2"/>
+          <p:cNvSpPr>
+            <a:spLocks noGrp="1"/>
+          </p:cNvSpPr>
+          <p:nvPr>
+            <p:ph idx="1"/>
+          </p:nvPr>
+        </p:nvSpPr>
+        <p:spPr/>
+        <p:txBody>
+          <a:bodyPr/>
+          <a:lstStyle/>
+          <a:p>
+            <a:pPr lvl="0" marL="0" indent="0">
+              <a:buNone/>
+            </a:pPr>
+            <a:r>
+              <a:rPr/>
+              <a:t> ## Question 8 3D plot of height versus weight, colored by position</a:t>
+            </a:r>
+          </a:p>
+        </p:txBody>
+      </p:sp>
+    </p:spTree>
+  </p:cSld>
+</p:sld>
+</file>
+
+<file path=ppt/slides/slide15.xml><?xml version="1.0" encoding="utf-8"?>
+<p:sld xmlns:a="http://schemas.openxmlformats.org/drawingml/2006/main" xmlns:r="http://schemas.openxmlformats.org/officeDocument/2006/relationships" xmlns:p="http://schemas.openxmlformats.org/presentationml/2006/main">
+  <p:cSld>
+    <p:spTree>
+      <p:nvGrpSpPr>
+        <p:cNvPr id="1" name=""/>
+        <p:cNvGrpSpPr/>
+        <p:nvPr/>
+      </p:nvGrpSpPr>
+      <p:grpSpPr>
+        <a:xfrm>
+          <a:off x="0" y="0"/>
+          <a:ext cx="0" cy="0"/>
+          <a:chOff x="0" y="0"/>
+          <a:chExt cx="0" cy="0"/>
+        </a:xfrm>
+      </p:grpSpPr>
+      <p:sp>
+        <p:nvSpPr>
+          <p:cNvPr id="2" name="Title 1"/>
+          <p:cNvSpPr>
+            <a:spLocks noGrp="1"/>
+          </p:cNvSpPr>
+          <p:nvPr>
+            <p:ph type="title"/>
+          </p:nvPr>
+        </p:nvSpPr>
+        <p:spPr/>
+        <p:txBody>
+          <a:bodyPr/>
+          <a:lstStyle/>
+          <a:p>
+            <a:pPr lvl="0" marL="0" indent="0">
+              <a:buNone/>
+            </a:pPr>
+            <a:r>
+              <a:rPr/>
+              <a:t>Slide</a:t>
+            </a:r>
+            <a:r>
+              <a:rPr/>
+              <a:t> </a:t>
+            </a:r>
+            <a:r>
+              <a:rPr/>
+              <a:t>with</a:t>
+            </a:r>
+            <a:r>
+              <a:rPr/>
+              <a:t> </a:t>
+            </a:r>
+            <a:r>
+              <a:rPr/>
+              <a:t>Bullets</a:t>
+            </a:r>
+          </a:p>
+        </p:txBody>
+      </p:sp>
+      <p:sp>
+        <p:nvSpPr>
+          <p:cNvPr id="3" name="Content Placeholder 2"/>
+          <p:cNvSpPr>
+            <a:spLocks noGrp="1"/>
+          </p:cNvSpPr>
+          <p:nvPr>
+            <p:ph idx="1"/>
+          </p:nvPr>
+        </p:nvSpPr>
+        <p:spPr/>
+        <p:txBody>
+          <a:bodyPr/>
+          <a:lstStyle/>
+          <a:p>
+            <a:pPr lvl="1"/>
+            <a:r>
+              <a:rPr/>
+              <a:t>Bullet 1</a:t>
+            </a:r>
+          </a:p>
+          <a:p>
+            <a:pPr lvl="1"/>
+            <a:r>
+              <a:rPr/>
+              <a:t>Bullet 2</a:t>
+            </a:r>
+          </a:p>
+          <a:p>
+            <a:pPr lvl="1"/>
+            <a:r>
+              <a:rPr/>
+              <a:t>Bullet 3</a:t>
+            </a:r>
+          </a:p>
+        </p:txBody>
+      </p:sp>
+    </p:spTree>
+  </p:cSld>
+</p:sld>
+</file>
+
+<file path=ppt/slides/slide16.xml><?xml version="1.0" encoding="utf-8"?>
+<p:sld xmlns:a="http://schemas.openxmlformats.org/drawingml/2006/main" xmlns:r="http://schemas.openxmlformats.org/officeDocument/2006/relationships" xmlns:p="http://schemas.openxmlformats.org/presentationml/2006/main">
+  <p:cSld>
+    <p:spTree>
+      <p:nvGrpSpPr>
+        <p:cNvPr id="1" name=""/>
+        <p:cNvGrpSpPr/>
+        <p:nvPr/>
+      </p:nvGrpSpPr>
+      <p:grpSpPr>
+        <a:xfrm>
+          <a:off x="0" y="0"/>
+          <a:ext cx="0" cy="0"/>
+          <a:chOff x="0" y="0"/>
+          <a:chExt cx="0" cy="0"/>
+        </a:xfrm>
+      </p:grpSpPr>
+      <p:sp>
+        <p:nvSpPr>
+          <p:cNvPr id="2" name="Title 1"/>
+          <p:cNvSpPr>
+            <a:spLocks noGrp="1"/>
+          </p:cNvSpPr>
+          <p:nvPr>
+            <p:ph type="title"/>
+          </p:nvPr>
+        </p:nvSpPr>
+        <p:spPr/>
+        <p:txBody>
+          <a:bodyPr/>
+          <a:lstStyle/>
+          <a:p>
+            <a:pPr lvl="0" marL="0" indent="0">
+              <a:buNone/>
+            </a:pPr>
+            <a:r>
+              <a:rPr/>
+              <a:t>Slide</a:t>
+            </a:r>
+            <a:r>
+              <a:rPr/>
+              <a:t> </a:t>
+            </a:r>
+            <a:r>
+              <a:rPr/>
+              <a:t>with</a:t>
+            </a:r>
+            <a:r>
+              <a:rPr/>
+              <a:t> </a:t>
+            </a:r>
+            <a:r>
+              <a:rPr/>
+              <a:t>R</a:t>
+            </a:r>
+            <a:r>
+              <a:rPr/>
+              <a:t> </a:t>
+            </a:r>
+            <a:r>
+              <a:rPr/>
+              <a:t>Output</a:t>
+            </a:r>
+          </a:p>
+        </p:txBody>
+      </p:sp>
+      <p:sp>
+        <p:nvSpPr>
+          <p:cNvPr id="3" name="Content Placeholder 2"/>
+          <p:cNvSpPr>
+            <a:spLocks noGrp="1"/>
+          </p:cNvSpPr>
+          <p:nvPr>
+            <p:ph idx="1"/>
+          </p:nvPr>
+        </p:nvSpPr>
+        <p:spPr/>
+        <p:txBody>
+          <a:bodyPr/>
+          <a:lstStyle/>
+          <a:p>
+            <a:pPr lvl="0" marL="1270000" indent="0">
+              <a:buNone/>
+            </a:pPr>
+            <a:r>
+              <a:rPr sz="1800" b="1">
+                <a:solidFill>
+                  <a:srgbClr val="007020"/>
+                </a:solidFill>
+                <a:latin typeface="Courier"/>
+              </a:rPr>
+              <a:t>summary</a:t>
+            </a:r>
+            <a:r>
+              <a:rPr sz="1800">
+                <a:latin typeface="Courier"/>
+              </a:rPr>
+              <a:t>(cars)</a:t>
+            </a:r>
+          </a:p>
+          <a:p>
+            <a:pPr lvl="0" marL="1270000" indent="0">
+              <a:buNone/>
+            </a:pPr>
+            <a:r>
+              <a:rPr sz="1800">
+                <a:latin typeface="Courier"/>
+              </a:rPr>
+              <a:t>##      speed           dist       
+##  Min.   : 4.0   Min.   :  2.00  
+##  1st Qu.:12.0   1st Qu.: 26.00  
+##  Median :15.0   Median : 36.00  
+##  Mean   :15.4   Mean   : 42.98  
+##  3rd Qu.:19.0   3rd Qu.: 56.00  
+##  Max.   :25.0   Max.   :120.00</a:t>
+            </a:r>
+          </a:p>
+        </p:txBody>
+      </p:sp>
+    </p:spTree>
+  </p:cSld>
+</p:sld>
+</file>
+
+<file path=ppt/slides/slide17.xml><?xml version="1.0" encoding="utf-8"?>
+<p:sld xmlns:a="http://schemas.openxmlformats.org/drawingml/2006/main" xmlns:r="http://schemas.openxmlformats.org/officeDocument/2006/relationships" xmlns:p="http://schemas.openxmlformats.org/presentationml/2006/main">
+  <p:cSld>
+    <p:spTree>
+      <p:nvGrpSpPr>
+        <p:cNvPr id="1" name=""/>
+        <p:cNvGrpSpPr/>
+        <p:nvPr/>
+      </p:nvGrpSpPr>
+      <p:grpSpPr>
+        <a:xfrm>
+          <a:off x="0" y="0"/>
+          <a:ext cx="0" cy="0"/>
+          <a:chOff x="0" y="0"/>
+          <a:chExt cx="0" cy="0"/>
+        </a:xfrm>
+      </p:grpSpPr>
+      <p:sp>
+        <p:nvSpPr>
+          <p:cNvPr id="2" name="Title 1"/>
+          <p:cNvSpPr>
+            <a:spLocks noGrp="1"/>
+          </p:cNvSpPr>
+          <p:nvPr>
+            <p:ph type="title"/>
+          </p:nvPr>
+        </p:nvSpPr>
+        <p:spPr/>
+        <p:txBody>
+          <a:bodyPr/>
+          <a:lstStyle/>
+          <a:p>
+            <a:pPr lvl="0" marL="0" indent="0">
+              <a:buNone/>
+            </a:pPr>
+            <a:r>
+              <a:rPr/>
+              <a:t>Slide</a:t>
+            </a:r>
+            <a:r>
+              <a:rPr/>
+              <a:t> </a:t>
+            </a:r>
+            <a:r>
+              <a:rPr/>
+              <a:t>with</a:t>
+            </a:r>
+            <a:r>
+              <a:rPr/>
+              <a:t> </a:t>
+            </a:r>
+            <a:r>
+              <a:rPr/>
+              <a:t>Plot</a:t>
+            </a:r>
+          </a:p>
+        </p:txBody>
+      </p:sp>
+      <p:pic>
+        <p:nvPicPr>
+          <p:cNvPr descr="Richard_Palmer_LiveSession_2_files/figure-pptx/pressure-1.png" id="0" name="Picture 1"/>
+          <p:cNvPicPr>
+            <a:picLocks noGrp="1" noChangeAspect="1"/>
+          </p:cNvPicPr>
+          <p:nvPr/>
+        </p:nvPicPr>
+        <p:blipFill>
+          <a:blip r:embed="rId2"/>
+          <a:stretch>
+            <a:fillRect/>
+          </a:stretch>
+        </p:blipFill>
+        <p:spPr bwMode="auto">
+          <a:xfrm>
+            <a:off x="1752600" y="1600200"/>
+            <a:ext cx="5651500" cy="4521200"/>
+          </a:xfrm>
+          <a:prstGeom prst="rect">
+            <a:avLst/>
+          </a:prstGeom>
+          <a:noFill/>
+          <a:ln w="9525">
+            <a:noFill/>
+            <a:headEnd/>
+            <a:tailEnd/>
+          </a:ln>
+        </p:spPr>
+      </p:pic>
+    </p:spTree>
+  </p:cSld>
+</p:sld>
+</file>
+
+<file path=ppt/slides/slide2.xml><?xml version="1.0" encoding="utf-8"?>
+<p:sld xmlns:a="http://schemas.openxmlformats.org/drawingml/2006/main" xmlns:r="http://schemas.openxmlformats.org/officeDocument/2006/relationships" xmlns:p="http://schemas.openxmlformats.org/presentationml/2006/main">
+  <p:cSld>
+    <p:spTree>
+      <p:nvGrpSpPr>
+        <p:cNvPr id="1" name=""/>
+        <p:cNvGrpSpPr/>
+        <p:nvPr/>
+      </p:nvGrpSpPr>
+      <p:grpSpPr>
+        <a:xfrm>
+          <a:off x="0" y="0"/>
+          <a:ext cx="0" cy="0"/>
+          <a:chOff x="0" y="0"/>
+          <a:chExt cx="0" cy="0"/>
+        </a:xfrm>
+      </p:grpSpPr>
+      <p:sp>
+        <p:nvSpPr>
+          <p:cNvPr id="3" name="Content Placeholder 2"/>
+          <p:cNvSpPr>
+            <a:spLocks noGrp="1"/>
+          </p:cNvSpPr>
+          <p:nvPr>
+            <p:ph idx="1"/>
+          </p:nvPr>
+        </p:nvSpPr>
+        <p:spPr/>
+        <p:txBody>
+          <a:bodyPr/>
+          <a:lstStyle/>
+          <a:p>
+            <a:pPr lvl="0" marL="1270000" indent="0">
+              <a:buNone/>
+            </a:pPr>
+            <a:r>
+              <a:rPr sz="1800">
+                <a:latin typeface="Courier"/>
+              </a:rPr>
+              <a:t>## 
+## Attaching package: 'dplyr'</a:t>
+            </a:r>
+          </a:p>
+          <a:p>
+            <a:pPr lvl="0" marL="1270000" indent="0">
+              <a:buNone/>
+            </a:pPr>
+            <a:r>
+              <a:rPr sz="1800">
+                <a:latin typeface="Courier"/>
+              </a:rPr>
+              <a:t>## The following objects are masked from 'package:stats':
+## 
+##     filter, lag</a:t>
+            </a:r>
+          </a:p>
+          <a:p>
+            <a:pPr lvl="0" marL="1270000" indent="0">
+              <a:buNone/>
+            </a:pPr>
+            <a:r>
+              <a:rPr sz="1800">
+                <a:latin typeface="Courier"/>
+              </a:rPr>
+              <a:t>## The following objects are masked from 'package:base':
+## 
+##     intersect, setdiff, setequal, union</a:t>
+            </a:r>
+          </a:p>
+        </p:txBody>
+      </p:sp>
+    </p:spTree>
+  </p:cSld>
+</p:sld>
+</file>
+
+<file path=ppt/slides/slide3.xml><?xml version="1.0" encoding="utf-8"?>
+<p:sld xmlns:a="http://schemas.openxmlformats.org/drawingml/2006/main" xmlns:r="http://schemas.openxmlformats.org/officeDocument/2006/relationships" xmlns:p="http://schemas.openxmlformats.org/presentationml/2006/main">
+  <p:cSld>
+    <p:spTree>
+      <p:nvGrpSpPr>
+        <p:cNvPr id="1" name=""/>
+        <p:cNvGrpSpPr/>
+        <p:nvPr/>
+      </p:nvGrpSpPr>
+      <p:grpSpPr>
+        <a:xfrm>
+          <a:off x="0" y="0"/>
+          <a:ext cx="0" cy="0"/>
+          <a:chOff x="0" y="0"/>
+          <a:chExt cx="0" cy="0"/>
+        </a:xfrm>
+      </p:grpSpPr>
+      <p:sp>
+        <p:nvSpPr>
+          <p:cNvPr id="2" name="Title 1"/>
+          <p:cNvSpPr>
+            <a:spLocks noGrp="1"/>
+          </p:cNvSpPr>
+          <p:nvPr>
+            <p:ph type="title"/>
+          </p:nvPr>
+        </p:nvSpPr>
+        <p:spPr/>
+        <p:txBody>
+          <a:bodyPr/>
+          <a:lstStyle/>
+          <a:p>
+            <a:pPr lvl="0" marL="0" indent="0">
+              <a:buNone/>
+            </a:pPr>
+            <a:r>
+              <a:rPr/>
+              <a:t>Question</a:t>
+            </a:r>
+            <a:r>
+              <a:rPr/>
+              <a:t> </a:t>
+            </a:r>
+            <a:r>
+              <a:rPr/>
+              <a:t>1</a:t>
+            </a:r>
+          </a:p>
+        </p:txBody>
+      </p:sp>
+      <p:sp>
+        <p:nvSpPr>
+          <p:cNvPr id="3" name="Content Placeholder 2"/>
+          <p:cNvSpPr>
+            <a:spLocks noGrp="1"/>
+          </p:cNvSpPr>
+          <p:nvPr>
+            <p:ph idx="1"/>
+          </p:nvPr>
+        </p:nvSpPr>
+        <p:spPr/>
+        <p:txBody>
+          <a:bodyPr/>
+          <a:lstStyle/>
+          <a:p>
+            <a:pPr lvl="0" marL="0" indent="0">
+              <a:buNone/>
+            </a:pPr>
+            <a:r>
+              <a:rPr/>
+              <a:t>Show the number of players per position </a:t>
+            </a:r>
+          </a:p>
+        </p:txBody>
+      </p:sp>
+    </p:spTree>
+  </p:cSld>
+</p:sld>
+</file>
+
 <file path=ppt/slides/slide4.xml><?xml version="1.0" encoding="utf-8"?>
 <p:sld xmlns:a="http://schemas.openxmlformats.org/drawingml/2006/main" xmlns:r="http://schemas.openxmlformats.org/officeDocument/2006/relationships" xmlns:p="http://schemas.openxmlformats.org/presentationml/2006/main">
   <p:cSld>
@@ -3422,7 +4078,7 @@
             </a:pPr>
             <a:r>
               <a:rPr/>
-              <a:t>Slide</a:t>
+              <a:t>Question</a:t>
             </a:r>
             <a:r>
               <a:rPr/>
@@ -3430,15 +4086,7 @@
             </a:r>
             <a:r>
               <a:rPr/>
-              <a:t>with</a:t>
-            </a:r>
-            <a:r>
-              <a:rPr/>
-              <a:t> </a:t>
-            </a:r>
-            <a:r>
-              <a:rPr/>
-              <a:t>Bullets</a:t>
+              <a:t>2</a:t>
             </a:r>
           </a:p>
         </p:txBody>
@@ -3458,24 +4106,23 @@
           <a:bodyPr/>
           <a:lstStyle/>
           <a:p>
-            <a:pPr lvl="1"/>
-            <a:r>
-              <a:rPr/>
-              <a:t>Bullet 1</a:t>
-            </a:r>
-          </a:p>
-          <a:p>
-            <a:pPr lvl="1"/>
-            <a:r>
-              <a:rPr/>
-              <a:t>Bullet 2</a:t>
-            </a:r>
-          </a:p>
-          <a:p>
-            <a:pPr lvl="1"/>
-            <a:r>
-              <a:rPr/>
-              <a:t>Bullet 3</a:t>
+            <a:pPr lvl="0" marL="0" indent="0">
+              <a:buNone/>
+            </a:pPr>
+            <a:r>
+              <a:rPr/>
+              <a:t>Compare the distribution of weight of centers with that of the weight of forwards</a:t>
+            </a:r>
+          </a:p>
+          <a:p>
+            <a:pPr lvl="0" marL="1270000" indent="0">
+              <a:buNone/>
+            </a:pPr>
+            <a:r>
+              <a:rPr sz="1800">
+                <a:latin typeface="Courier"/>
+              </a:rPr>
+              <a:t>## Warning: Removed 3 rows containing non-finite values (stat_bin).</a:t>
             </a:r>
           </a:p>
         </p:txBody>
@@ -3502,108 +4149,36 @@
           <a:chExt cx="0" cy="0"/>
         </a:xfrm>
       </p:grpSpPr>
-      <p:sp>
-        <p:nvSpPr>
-          <p:cNvPr id="2" name="Title 1"/>
-          <p:cNvSpPr>
-            <a:spLocks noGrp="1"/>
-          </p:cNvSpPr>
-          <p:nvPr>
-            <p:ph type="title"/>
-          </p:nvPr>
-        </p:nvSpPr>
-        <p:spPr/>
-        <p:txBody>
-          <a:bodyPr/>
-          <a:lstStyle/>
-          <a:p>
-            <a:pPr lvl="0" marL="0" indent="0">
-              <a:buNone/>
-            </a:pPr>
-            <a:r>
-              <a:rPr/>
-              <a:t>Slide</a:t>
-            </a:r>
-            <a:r>
-              <a:rPr/>
-              <a:t> </a:t>
-            </a:r>
-            <a:r>
-              <a:rPr/>
-              <a:t>with</a:t>
-            </a:r>
-            <a:r>
-              <a:rPr/>
-              <a:t> </a:t>
-            </a:r>
-            <a:r>
-              <a:rPr/>
-              <a:t>R</a:t>
-            </a:r>
-            <a:r>
-              <a:rPr/>
-              <a:t> </a:t>
-            </a:r>
-            <a:r>
-              <a:rPr/>
-              <a:t>Output</a:t>
-            </a:r>
-          </a:p>
-        </p:txBody>
-      </p:sp>
-      <p:sp>
-        <p:nvSpPr>
-          <p:cNvPr id="3" name="Content Placeholder 2"/>
-          <p:cNvSpPr>
-            <a:spLocks noGrp="1"/>
-          </p:cNvSpPr>
-          <p:nvPr>
-            <p:ph idx="1"/>
-          </p:nvPr>
-        </p:nvSpPr>
-        <p:spPr/>
-        <p:txBody>
-          <a:bodyPr/>
-          <a:lstStyle/>
-          <a:p>
-            <a:pPr lvl="0" marL="1270000" indent="0">
-              <a:buNone/>
-            </a:pPr>
-            <a:r>
-              <a:rPr sz="1800" b="1">
-                <a:solidFill>
-                  <a:srgbClr val="007020"/>
-                </a:solidFill>
-                <a:latin typeface="Courier"/>
-              </a:rPr>
-              <a:t>summary</a:t>
-            </a:r>
-            <a:r>
-              <a:rPr sz="1800">
-                <a:latin typeface="Courier"/>
-              </a:rPr>
-              <a:t>(cars)</a:t>
-            </a:r>
-          </a:p>
-          <a:p>
-            <a:pPr lvl="0" marL="1270000" indent="0">
-              <a:buNone/>
-            </a:pPr>
-            <a:r>
-              <a:rPr sz="1800">
-                <a:latin typeface="Courier"/>
-              </a:rPr>
-              <a:t>##      speed           dist       
-##  Min.   : 4.0   Min.   :  2.00  
-##  1st Qu.:12.0   1st Qu.: 26.00  
-##  Median :15.0   Median : 36.00  
-##  Mean   :15.4   Mean   : 42.98  
-##  3rd Qu.:19.0   3rd Qu.: 56.00  
-##  Max.   :25.0   Max.   :120.00</a:t>
-            </a:r>
-          </a:p>
-        </p:txBody>
-      </p:sp>
+      <p:pic>
+        <p:nvPicPr>
+          <p:cNvPr descr="Richard_Palmer_LiveSession_2_files/figure-pptx/unnamed-chunk-3-1.png" id="0" name="Picture 1"/>
+          <p:cNvPicPr>
+            <a:picLocks noGrp="1" noChangeAspect="1"/>
+          </p:cNvPicPr>
+          <p:nvPr/>
+        </p:nvPicPr>
+        <p:blipFill>
+          <a:blip r:embed="rId2"/>
+          <a:stretch>
+            <a:fillRect/>
+          </a:stretch>
+        </p:blipFill>
+        <p:spPr bwMode="auto">
+          <a:xfrm>
+            <a:off x="1752600" y="1600200"/>
+            <a:ext cx="5651500" cy="4521200"/>
+          </a:xfrm>
+          <a:prstGeom prst="rect">
+            <a:avLst/>
+          </a:prstGeom>
+          <a:noFill/>
+          <a:ln w="9525">
+            <a:noFill/>
+            <a:headEnd/>
+            <a:tailEnd/>
+          </a:ln>
+        </p:spPr>
+      </p:pic>
     </p:spTree>
   </p:cSld>
 </p:sld>
@@ -3646,7 +4221,7 @@
             </a:pPr>
             <a:r>
               <a:rPr/>
-              <a:t>Slide</a:t>
+              <a:t>Question</a:t>
             </a:r>
             <a:r>
               <a:rPr/>
@@ -3654,7 +4229,79 @@
             </a:r>
             <a:r>
               <a:rPr/>
-              <a:t>with</a:t>
+              <a:t>3</a:t>
+            </a:r>
+          </a:p>
+        </p:txBody>
+      </p:sp>
+      <p:sp>
+        <p:nvSpPr>
+          <p:cNvPr id="3" name="Content Placeholder 2"/>
+          <p:cNvSpPr>
+            <a:spLocks noGrp="1"/>
+          </p:cNvSpPr>
+          <p:nvPr>
+            <p:ph idx="1"/>
+          </p:nvPr>
+        </p:nvSpPr>
+        <p:spPr/>
+        <p:txBody>
+          <a:bodyPr/>
+          <a:lstStyle/>
+          <a:p>
+            <a:pPr lvl="0" marL="0" indent="0">
+              <a:buNone/>
+            </a:pPr>
+            <a:r>
+              <a:rPr/>
+              <a:t>Compare the distribution of the height of centers with that of the height of forwards </a:t>
+            </a:r>
+          </a:p>
+        </p:txBody>
+      </p:sp>
+    </p:spTree>
+  </p:cSld>
+</p:sld>
+</file>
+
+<file path=ppt/slides/slide7.xml><?xml version="1.0" encoding="utf-8"?>
+<p:sld xmlns:a="http://schemas.openxmlformats.org/drawingml/2006/main" xmlns:r="http://schemas.openxmlformats.org/officeDocument/2006/relationships" xmlns:p="http://schemas.openxmlformats.org/presentationml/2006/main">
+  <p:cSld>
+    <p:spTree>
+      <p:nvGrpSpPr>
+        <p:cNvPr id="1" name=""/>
+        <p:cNvGrpSpPr/>
+        <p:nvPr/>
+      </p:nvGrpSpPr>
+      <p:grpSpPr>
+        <a:xfrm>
+          <a:off x="0" y="0"/>
+          <a:ext cx="0" cy="0"/>
+          <a:chOff x="0" y="0"/>
+          <a:chExt cx="0" cy="0"/>
+        </a:xfrm>
+      </p:grpSpPr>
+      <p:sp>
+        <p:nvSpPr>
+          <p:cNvPr id="2" name="Title 1"/>
+          <p:cNvSpPr>
+            <a:spLocks noGrp="1"/>
+          </p:cNvSpPr>
+          <p:nvPr>
+            <p:ph type="title"/>
+          </p:nvPr>
+        </p:nvSpPr>
+        <p:spPr/>
+        <p:txBody>
+          <a:bodyPr/>
+          <a:lstStyle/>
+          <a:p>
+            <a:pPr lvl="0" marL="0" indent="0">
+              <a:buNone/>
+            </a:pPr>
+            <a:r>
+              <a:rPr/>
+              <a:t>Question</a:t>
             </a:r>
             <a:r>
               <a:rPr/>
@@ -3662,14 +4309,152 @@
             </a:r>
             <a:r>
               <a:rPr/>
-              <a:t>Plot</a:t>
-            </a:r>
-          </a:p>
-        </p:txBody>
-      </p:sp>
+              <a:t>4</a:t>
+            </a:r>
+          </a:p>
+        </p:txBody>
+      </p:sp>
+      <p:sp>
+        <p:nvSpPr>
+          <p:cNvPr id="3" name="Content Placeholder 2"/>
+          <p:cNvSpPr>
+            <a:spLocks noGrp="1"/>
+          </p:cNvSpPr>
+          <p:nvPr>
+            <p:ph idx="1"/>
+          </p:nvPr>
+        </p:nvSpPr>
+        <p:spPr/>
+        <p:txBody>
+          <a:bodyPr/>
+          <a:lstStyle/>
+          <a:p>
+            <a:pPr lvl="0" marL="0" indent="0">
+              <a:buNone/>
+            </a:pPr>
+            <a:r>
+              <a:rPr/>
+              <a:t>Investigate distribution of height across all positions </a:t>
+            </a:r>
+          </a:p>
+        </p:txBody>
+      </p:sp>
+    </p:spTree>
+  </p:cSld>
+</p:sld>
+</file>
+
+<file path=ppt/slides/slide8.xml><?xml version="1.0" encoding="utf-8"?>
+<p:sld xmlns:a="http://schemas.openxmlformats.org/drawingml/2006/main" xmlns:r="http://schemas.openxmlformats.org/officeDocument/2006/relationships" xmlns:p="http://schemas.openxmlformats.org/presentationml/2006/main">
+  <p:cSld>
+    <p:spTree>
+      <p:nvGrpSpPr>
+        <p:cNvPr id="1" name=""/>
+        <p:cNvGrpSpPr/>
+        <p:nvPr/>
+      </p:nvGrpSpPr>
+      <p:grpSpPr>
+        <a:xfrm>
+          <a:off x="0" y="0"/>
+          <a:ext cx="0" cy="0"/>
+          <a:chOff x="0" y="0"/>
+          <a:chExt cx="0" cy="0"/>
+        </a:xfrm>
+      </p:grpSpPr>
+      <p:sp>
+        <p:nvSpPr>
+          <p:cNvPr id="2" name="Title 1"/>
+          <p:cNvSpPr>
+            <a:spLocks noGrp="1"/>
+          </p:cNvSpPr>
+          <p:nvPr>
+            <p:ph type="title"/>
+          </p:nvPr>
+        </p:nvSpPr>
+        <p:spPr/>
+        <p:txBody>
+          <a:bodyPr/>
+          <a:lstStyle/>
+          <a:p>
+            <a:pPr lvl="0" marL="0" indent="0">
+              <a:buNone/>
+            </a:pPr>
+            <a:r>
+              <a:rPr/>
+              <a:t>Question</a:t>
+            </a:r>
+            <a:r>
+              <a:rPr/>
+              <a:t> </a:t>
+            </a:r>
+            <a:r>
+              <a:rPr/>
+              <a:t>5</a:t>
+            </a:r>
+          </a:p>
+        </p:txBody>
+      </p:sp>
+      <p:sp>
+        <p:nvSpPr>
+          <p:cNvPr id="3" name="Content Placeholder 2"/>
+          <p:cNvSpPr>
+            <a:spLocks noGrp="1"/>
+          </p:cNvSpPr>
+          <p:nvPr>
+            <p:ph idx="1"/>
+          </p:nvPr>
+        </p:nvSpPr>
+        <p:spPr/>
+        <p:txBody>
+          <a:bodyPr/>
+          <a:lstStyle/>
+          <a:p>
+            <a:pPr lvl="0" marL="0" indent="0">
+              <a:buNone/>
+            </a:pPr>
+            <a:r>
+              <a:rPr/>
+              <a:t>Investigate how a players height is related to his weight</a:t>
+            </a:r>
+          </a:p>
+          <a:p>
+            <a:pPr lvl="0" marL="1270000" indent="0">
+              <a:buNone/>
+            </a:pPr>
+            <a:r>
+              <a:rPr sz="1800">
+                <a:latin typeface="Courier"/>
+              </a:rPr>
+              <a:t>## Warning: Removed 6 rows containing missing values (geom_point).</a:t>
+            </a:r>
+          </a:p>
+        </p:txBody>
+      </p:sp>
+    </p:spTree>
+  </p:cSld>
+</p:sld>
+</file>
+
+<file path=ppt/slides/slide9.xml><?xml version="1.0" encoding="utf-8"?>
+<p:sld xmlns:a="http://schemas.openxmlformats.org/drawingml/2006/main" xmlns:r="http://schemas.openxmlformats.org/officeDocument/2006/relationships" xmlns:p="http://schemas.openxmlformats.org/presentationml/2006/main">
+  <p:cSld>
+    <p:spTree>
+      <p:nvGrpSpPr>
+        <p:cNvPr id="1" name=""/>
+        <p:cNvGrpSpPr/>
+        <p:nvPr/>
+      </p:nvGrpSpPr>
+      <p:grpSpPr>
+        <a:xfrm>
+          <a:off x="0" y="0"/>
+          <a:ext cx="0" cy="0"/>
+          <a:chOff x="0" y="0"/>
+          <a:chExt cx="0" cy="0"/>
+        </a:xfrm>
+      </p:grpSpPr>
       <p:pic>
         <p:nvPicPr>
-          <p:cNvPr descr="Richard_Palmer_LiveSession_2_files/figure-pptx/pressure-1.png" id="0" name="Picture 1"/>
+          <p:cNvPr descr="Richard_Palmer_LiveSession_2_files/figure-pptx/unnamed-chunk-6-1.png" id="0" name="Picture 1"/>
           <p:cNvPicPr>
             <a:picLocks noGrp="1" noChangeAspect="1"/>
           </p:cNvPicPr>

</xml_diff>

<commit_message>
turn true on for everything
</commit_message>
<xml_diff>
--- a/Unit 2/Richard_Palmer_LiveSession_2.pptx
+++ b/Unit 2/Richard_Palmer_LiveSession_2.pptx
@@ -23,6 +23,8 @@
     <p:sldId id="271" r:id="rId17"/>
     <p:sldId id="272" r:id="rId18"/>
     <p:sldId id="273" r:id="rId19"/>
+    <p:sldId id="274" r:id="rId20"/>
+    <p:sldId id="275" r:id="rId21"/>
   </p:sldIdLst>
   <p:sldSz cx="9144000" cy="6858000" type="screen4x3"/>
   <p:notesSz cx="6858000" cy="9144000"/>
@@ -3255,7 +3257,7 @@
       </p:grpSpPr>
       <p:pic>
         <p:nvPicPr>
-          <p:cNvPr descr="Richard_Palmer_LiveSession_2_files/figure-pptx/unnamed-chunk-6-1.png" id="0" name="Picture 1"/>
+          <p:cNvPr descr="Richard_Palmer_LiveSession_2_files/figure-pptx/unnamed-chunk-5-1.png" id="0" name="Picture 1"/>
           <p:cNvPicPr>
             <a:picLocks noGrp="1" noChangeAspect="1"/>
           </p:cNvPicPr>
@@ -3333,7 +3335,7 @@
             </a:r>
             <a:r>
               <a:rPr/>
-              <a:t>6</a:t>
+              <a:t>5</a:t>
             </a:r>
           </a:p>
         </p:txBody>
@@ -3358,7 +3360,177 @@
             </a:pPr>
             <a:r>
               <a:rPr/>
-              <a:t>Is there any difference in height/weight relationship among positions?</a:t>
+              <a:t>Investigate how a players height is related to his weight</a:t>
+            </a:r>
+          </a:p>
+          <a:p>
+            <a:pPr lvl="0" marL="1270000" indent="0">
+              <a:buNone/>
+            </a:pPr>
+            <a:r>
+              <a:rPr sz="1800">
+                <a:latin typeface="Courier"/>
+              </a:rPr>
+              <a:t>BBall </a:t>
+            </a:r>
+            <a:r>
+              <a:rPr sz="1800">
+                <a:solidFill>
+                  <a:srgbClr val="666666"/>
+                </a:solidFill>
+                <a:latin typeface="Courier"/>
+              </a:rPr>
+              <a:t>%&gt;%</a:t>
+            </a:r>
+            <a:r>
+              <a:rPr sz="1800">
+                <a:solidFill>
+                  <a:srgbClr val="4070A0"/>
+                </a:solidFill>
+                <a:latin typeface="Courier"/>
+              </a:rPr>
+              <a:t> </a:t>
+            </a:r>
+            <a:r>
+              <a:rPr sz="1800" b="1">
+                <a:solidFill>
+                  <a:srgbClr val="007020"/>
+                </a:solidFill>
+                <a:latin typeface="Courier"/>
+              </a:rPr>
+              <a:t>ggplot</a:t>
+            </a:r>
+            <a:r>
+              <a:rPr sz="1800">
+                <a:latin typeface="Courier"/>
+              </a:rPr>
+              <a:t>(</a:t>
+            </a:r>
+            <a:r>
+              <a:rPr sz="1800" b="1">
+                <a:solidFill>
+                  <a:srgbClr val="007020"/>
+                </a:solidFill>
+                <a:latin typeface="Courier"/>
+              </a:rPr>
+              <a:t>aes</a:t>
+            </a:r>
+            <a:r>
+              <a:rPr sz="1800">
+                <a:latin typeface="Courier"/>
+              </a:rPr>
+              <a:t>(</a:t>
+            </a:r>
+            <a:r>
+              <a:rPr sz="1800">
+                <a:solidFill>
+                  <a:srgbClr val="902000"/>
+                </a:solidFill>
+                <a:latin typeface="Courier"/>
+              </a:rPr>
+              <a:t>x=</a:t>
+            </a:r>
+            <a:r>
+              <a:rPr sz="1800">
+                <a:latin typeface="Courier"/>
+              </a:rPr>
+              <a:t>weight,</a:t>
+            </a:r>
+            <a:r>
+              <a:rPr sz="1800">
+                <a:solidFill>
+                  <a:srgbClr val="902000"/>
+                </a:solidFill>
+                <a:latin typeface="Courier"/>
+              </a:rPr>
+              <a:t>y=</a:t>
+            </a:r>
+            <a:r>
+              <a:rPr sz="1800">
+                <a:latin typeface="Courier"/>
+              </a:rPr>
+              <a:t>height_inches)) </a:t>
+            </a:r>
+            <a:r>
+              <a:rPr sz="1800">
+                <a:solidFill>
+                  <a:srgbClr val="666666"/>
+                </a:solidFill>
+                <a:latin typeface="Courier"/>
+              </a:rPr>
+              <a:t>+</a:t>
+            </a:r>
+            <a:r>
+              <a:rPr sz="1800">
+                <a:solidFill>
+                  <a:srgbClr val="4070A0"/>
+                </a:solidFill>
+                <a:latin typeface="Courier"/>
+              </a:rPr>
+              <a:t> </a:t>
+            </a:r>
+            <a:r>
+              <a:rPr sz="1800" b="1">
+                <a:solidFill>
+                  <a:srgbClr val="007020"/>
+                </a:solidFill>
+                <a:latin typeface="Courier"/>
+              </a:rPr>
+              <a:t>geom_point</a:t>
+            </a:r>
+            <a:r>
+              <a:rPr sz="1800">
+                <a:latin typeface="Courier"/>
+              </a:rPr>
+              <a:t>() </a:t>
+            </a:r>
+            <a:r>
+              <a:rPr sz="1800">
+                <a:solidFill>
+                  <a:srgbClr val="666666"/>
+                </a:solidFill>
+                <a:latin typeface="Courier"/>
+              </a:rPr>
+              <a:t>+</a:t>
+            </a:r>
+            <a:r>
+              <a:rPr sz="1800">
+                <a:solidFill>
+                  <a:srgbClr val="4070A0"/>
+                </a:solidFill>
+                <a:latin typeface="Courier"/>
+              </a:rPr>
+              <a:t> </a:t>
+            </a:r>
+            <a:r>
+              <a:rPr sz="1800" b="1">
+                <a:solidFill>
+                  <a:srgbClr val="007020"/>
+                </a:solidFill>
+                <a:latin typeface="Courier"/>
+              </a:rPr>
+              <a:t>ggtitle</a:t>
+            </a:r>
+            <a:r>
+              <a:rPr sz="1800">
+                <a:latin typeface="Courier"/>
+              </a:rPr>
+              <a:t>(</a:t>
+            </a:r>
+            <a:r>
+              <a:rPr sz="1800">
+                <a:solidFill>
+                  <a:srgbClr val="4070A0"/>
+                </a:solidFill>
+                <a:latin typeface="Courier"/>
+              </a:rPr>
+              <a:t>"Height versus Weight"</a:t>
+            </a:r>
+            <a:r>
+              <a:rPr sz="1800">
+                <a:latin typeface="Courier"/>
+              </a:rPr>
+              <a:t>);</a:t>
             </a:r>
           </a:p>
           <a:p>
@@ -3380,6 +3552,334 @@
 </file>
 
 <file path=ppt/slides/slide12.xml><?xml version="1.0" encoding="utf-8"?>
+<p:sld xmlns:a="http://schemas.openxmlformats.org/drawingml/2006/main" xmlns:r="http://schemas.openxmlformats.org/officeDocument/2006/relationships" xmlns:p="http://schemas.openxmlformats.org/presentationml/2006/main">
+  <p:cSld>
+    <p:spTree>
+      <p:nvGrpSpPr>
+        <p:cNvPr id="1" name=""/>
+        <p:cNvGrpSpPr/>
+        <p:nvPr/>
+      </p:nvGrpSpPr>
+      <p:grpSpPr>
+        <a:xfrm>
+          <a:off x="0" y="0"/>
+          <a:ext cx="0" cy="0"/>
+          <a:chOff x="0" y="0"/>
+          <a:chExt cx="0" cy="0"/>
+        </a:xfrm>
+      </p:grpSpPr>
+      <p:pic>
+        <p:nvPicPr>
+          <p:cNvPr descr="Richard_Palmer_LiveSession_2_files/figure-pptx/unnamed-chunk-6-1.png" id="0" name="Picture 1"/>
+          <p:cNvPicPr>
+            <a:picLocks noGrp="1" noChangeAspect="1"/>
+          </p:cNvPicPr>
+          <p:nvPr/>
+        </p:nvPicPr>
+        <p:blipFill>
+          <a:blip r:embed="rId2"/>
+          <a:stretch>
+            <a:fillRect/>
+          </a:stretch>
+        </p:blipFill>
+        <p:spPr bwMode="auto">
+          <a:xfrm>
+            <a:off x="1752600" y="1600200"/>
+            <a:ext cx="5651500" cy="4521200"/>
+          </a:xfrm>
+          <a:prstGeom prst="rect">
+            <a:avLst/>
+          </a:prstGeom>
+          <a:noFill/>
+          <a:ln w="9525">
+            <a:noFill/>
+            <a:headEnd/>
+            <a:tailEnd/>
+          </a:ln>
+        </p:spPr>
+      </p:pic>
+    </p:spTree>
+  </p:cSld>
+</p:sld>
+</file>
+
+<file path=ppt/slides/slide13.xml><?xml version="1.0" encoding="utf-8"?>
+<p:sld xmlns:a="http://schemas.openxmlformats.org/drawingml/2006/main" xmlns:r="http://schemas.openxmlformats.org/officeDocument/2006/relationships" xmlns:p="http://schemas.openxmlformats.org/presentationml/2006/main">
+  <p:cSld>
+    <p:spTree>
+      <p:nvGrpSpPr>
+        <p:cNvPr id="1" name=""/>
+        <p:cNvGrpSpPr/>
+        <p:nvPr/>
+      </p:nvGrpSpPr>
+      <p:grpSpPr>
+        <a:xfrm>
+          <a:off x="0" y="0"/>
+          <a:ext cx="0" cy="0"/>
+          <a:chOff x="0" y="0"/>
+          <a:chExt cx="0" cy="0"/>
+        </a:xfrm>
+      </p:grpSpPr>
+      <p:sp>
+        <p:nvSpPr>
+          <p:cNvPr id="2" name="Title 1"/>
+          <p:cNvSpPr>
+            <a:spLocks noGrp="1"/>
+          </p:cNvSpPr>
+          <p:nvPr>
+            <p:ph type="title"/>
+          </p:nvPr>
+        </p:nvSpPr>
+        <p:spPr/>
+        <p:txBody>
+          <a:bodyPr/>
+          <a:lstStyle/>
+          <a:p>
+            <a:pPr lvl="0" marL="0" indent="0">
+              <a:buNone/>
+            </a:pPr>
+            <a:r>
+              <a:rPr/>
+              <a:t>Question</a:t>
+            </a:r>
+            <a:r>
+              <a:rPr/>
+              <a:t> </a:t>
+            </a:r>
+            <a:r>
+              <a:rPr/>
+              <a:t>6</a:t>
+            </a:r>
+          </a:p>
+        </p:txBody>
+      </p:sp>
+      <p:sp>
+        <p:nvSpPr>
+          <p:cNvPr id="3" name="Content Placeholder 2"/>
+          <p:cNvSpPr>
+            <a:spLocks noGrp="1"/>
+          </p:cNvSpPr>
+          <p:nvPr>
+            <p:ph idx="1"/>
+          </p:nvPr>
+        </p:nvSpPr>
+        <p:spPr/>
+        <p:txBody>
+          <a:bodyPr/>
+          <a:lstStyle/>
+          <a:p>
+            <a:pPr lvl="0" marL="0" indent="0">
+              <a:buNone/>
+            </a:pPr>
+            <a:r>
+              <a:rPr/>
+              <a:t>Is there any difference in height/weight relationship among positions?</a:t>
+            </a:r>
+          </a:p>
+          <a:p>
+            <a:pPr lvl="0" marL="1270000" indent="0">
+              <a:buNone/>
+            </a:pPr>
+            <a:r>
+              <a:rPr sz="1800">
+                <a:latin typeface="Courier"/>
+              </a:rPr>
+              <a:t>BBall </a:t>
+            </a:r>
+            <a:r>
+              <a:rPr sz="1800">
+                <a:solidFill>
+                  <a:srgbClr val="666666"/>
+                </a:solidFill>
+                <a:latin typeface="Courier"/>
+              </a:rPr>
+              <a:t>%&gt;%</a:t>
+            </a:r>
+            <a:r>
+              <a:rPr sz="1800">
+                <a:solidFill>
+                  <a:srgbClr val="4070A0"/>
+                </a:solidFill>
+                <a:latin typeface="Courier"/>
+              </a:rPr>
+              <a:t> </a:t>
+            </a:r>
+            <a:r>
+              <a:rPr sz="1800" b="1">
+                <a:solidFill>
+                  <a:srgbClr val="007020"/>
+                </a:solidFill>
+                <a:latin typeface="Courier"/>
+              </a:rPr>
+              <a:t>ggplot</a:t>
+            </a:r>
+            <a:r>
+              <a:rPr sz="1800">
+                <a:latin typeface="Courier"/>
+              </a:rPr>
+              <a:t>(</a:t>
+            </a:r>
+            <a:r>
+              <a:rPr sz="1800" b="1">
+                <a:solidFill>
+                  <a:srgbClr val="007020"/>
+                </a:solidFill>
+                <a:latin typeface="Courier"/>
+              </a:rPr>
+              <a:t>aes</a:t>
+            </a:r>
+            <a:r>
+              <a:rPr sz="1800">
+                <a:latin typeface="Courier"/>
+              </a:rPr>
+              <a:t>(</a:t>
+            </a:r>
+            <a:r>
+              <a:rPr sz="1800">
+                <a:solidFill>
+                  <a:srgbClr val="902000"/>
+                </a:solidFill>
+                <a:latin typeface="Courier"/>
+              </a:rPr>
+              <a:t>x=</a:t>
+            </a:r>
+            <a:r>
+              <a:rPr sz="1800">
+                <a:latin typeface="Courier"/>
+              </a:rPr>
+              <a:t>weight,</a:t>
+            </a:r>
+            <a:r>
+              <a:rPr sz="1800">
+                <a:solidFill>
+                  <a:srgbClr val="902000"/>
+                </a:solidFill>
+                <a:latin typeface="Courier"/>
+              </a:rPr>
+              <a:t>y=</a:t>
+            </a:r>
+            <a:r>
+              <a:rPr sz="1800">
+                <a:latin typeface="Courier"/>
+              </a:rPr>
+              <a:t>height_inches,</a:t>
+            </a:r>
+            <a:r>
+              <a:rPr sz="1800">
+                <a:solidFill>
+                  <a:srgbClr val="902000"/>
+                </a:solidFill>
+                <a:latin typeface="Courier"/>
+              </a:rPr>
+              <a:t>color=</a:t>
+            </a:r>
+            <a:r>
+              <a:rPr sz="1800">
+                <a:latin typeface="Courier"/>
+              </a:rPr>
+              <a:t>position)) </a:t>
+            </a:r>
+            <a:r>
+              <a:rPr sz="1800">
+                <a:solidFill>
+                  <a:srgbClr val="666666"/>
+                </a:solidFill>
+                <a:latin typeface="Courier"/>
+              </a:rPr>
+              <a:t>+</a:t>
+            </a:r>
+            <a:r>
+              <a:rPr sz="1800">
+                <a:solidFill>
+                  <a:srgbClr val="4070A0"/>
+                </a:solidFill>
+                <a:latin typeface="Courier"/>
+              </a:rPr>
+              <a:t> </a:t>
+            </a:r>
+            <a:r>
+              <a:rPr sz="1800" b="1">
+                <a:solidFill>
+                  <a:srgbClr val="007020"/>
+                </a:solidFill>
+                <a:latin typeface="Courier"/>
+              </a:rPr>
+              <a:t>geom_point</a:t>
+            </a:r>
+            <a:r>
+              <a:rPr sz="1800">
+                <a:latin typeface="Courier"/>
+              </a:rPr>
+              <a:t>() </a:t>
+            </a:r>
+            <a:r>
+              <a:rPr sz="1800">
+                <a:solidFill>
+                  <a:srgbClr val="666666"/>
+                </a:solidFill>
+                <a:latin typeface="Courier"/>
+              </a:rPr>
+              <a:t>+</a:t>
+            </a:r>
+            <a:r>
+              <a:rPr sz="1800">
+                <a:solidFill>
+                  <a:srgbClr val="4070A0"/>
+                </a:solidFill>
+                <a:latin typeface="Courier"/>
+              </a:rPr>
+              <a:t> </a:t>
+            </a:r>
+            <a:r>
+              <a:rPr sz="1800" b="1">
+                <a:solidFill>
+                  <a:srgbClr val="007020"/>
+                </a:solidFill>
+                <a:latin typeface="Courier"/>
+              </a:rPr>
+              <a:t>ggtitle</a:t>
+            </a:r>
+            <a:r>
+              <a:rPr sz="1800">
+                <a:latin typeface="Courier"/>
+              </a:rPr>
+              <a:t>(</a:t>
+            </a:r>
+            <a:r>
+              <a:rPr sz="1800">
+                <a:solidFill>
+                  <a:srgbClr val="4070A0"/>
+                </a:solidFill>
+                <a:latin typeface="Courier"/>
+              </a:rPr>
+              <a:t>"Height versus Weight"</a:t>
+            </a:r>
+            <a:r>
+              <a:rPr sz="1800">
+                <a:latin typeface="Courier"/>
+              </a:rPr>
+              <a:t>);</a:t>
+            </a:r>
+          </a:p>
+          <a:p>
+            <a:pPr lvl="0" marL="1270000" indent="0">
+              <a:buNone/>
+            </a:pPr>
+            <a:r>
+              <a:rPr sz="1800">
+                <a:latin typeface="Courier"/>
+              </a:rPr>
+              <a:t>## Warning: Removed 6 rows containing missing values (geom_point).</a:t>
+            </a:r>
+          </a:p>
+        </p:txBody>
+      </p:sp>
+    </p:spTree>
+  </p:cSld>
+</p:sld>
+</file>
+
+<file path=ppt/slides/slide14.xml><?xml version="1.0" encoding="utf-8"?>
 <p:sld xmlns:a="http://schemas.openxmlformats.org/drawingml/2006/main" xmlns:r="http://schemas.openxmlformats.org/officeDocument/2006/relationships" xmlns:p="http://schemas.openxmlformats.org/presentationml/2006/main">
   <p:cSld>
     <p:spTree>
@@ -3431,7 +3931,7 @@
 </p:sld>
 </file>
 
-<file path=ppt/slides/slide13.xml><?xml version="1.0" encoding="utf-8"?>
+<file path=ppt/slides/slide15.xml><?xml version="1.0" encoding="utf-8"?>
 <p:sld xmlns:a="http://schemas.openxmlformats.org/drawingml/2006/main" xmlns:r="http://schemas.openxmlformats.org/officeDocument/2006/relationships" xmlns:p="http://schemas.openxmlformats.org/presentationml/2006/main">
   <p:cSld>
     <p:spTree>
@@ -3512,6 +4012,176 @@
               <a:rPr sz="1800">
                 <a:latin typeface="Courier"/>
               </a:rPr>
+              <a:t>BBall </a:t>
+            </a:r>
+            <a:r>
+              <a:rPr sz="1800">
+                <a:solidFill>
+                  <a:srgbClr val="666666"/>
+                </a:solidFill>
+                <a:latin typeface="Courier"/>
+              </a:rPr>
+              <a:t>%&gt;%</a:t>
+            </a:r>
+            <a:r>
+              <a:rPr sz="1800">
+                <a:solidFill>
+                  <a:srgbClr val="4070A0"/>
+                </a:solidFill>
+                <a:latin typeface="Courier"/>
+              </a:rPr>
+              <a:t> </a:t>
+            </a:r>
+            <a:r>
+              <a:rPr sz="1800" b="1">
+                <a:solidFill>
+                  <a:srgbClr val="007020"/>
+                </a:solidFill>
+                <a:latin typeface="Courier"/>
+              </a:rPr>
+              <a:t>ggplot</a:t>
+            </a:r>
+            <a:r>
+              <a:rPr sz="1800">
+                <a:latin typeface="Courier"/>
+              </a:rPr>
+              <a:t>(</a:t>
+            </a:r>
+            <a:r>
+              <a:rPr sz="1800" b="1">
+                <a:solidFill>
+                  <a:srgbClr val="007020"/>
+                </a:solidFill>
+                <a:latin typeface="Courier"/>
+              </a:rPr>
+              <a:t>aes</a:t>
+            </a:r>
+            <a:r>
+              <a:rPr sz="1800">
+                <a:latin typeface="Courier"/>
+              </a:rPr>
+              <a:t>(</a:t>
+            </a:r>
+            <a:r>
+              <a:rPr sz="1800">
+                <a:solidFill>
+                  <a:srgbClr val="902000"/>
+                </a:solidFill>
+                <a:latin typeface="Courier"/>
+              </a:rPr>
+              <a:t>x=</a:t>
+            </a:r>
+            <a:r>
+              <a:rPr sz="1800">
+                <a:latin typeface="Courier"/>
+              </a:rPr>
+              <a:t>year_start,</a:t>
+            </a:r>
+            <a:r>
+              <a:rPr sz="1800">
+                <a:solidFill>
+                  <a:srgbClr val="902000"/>
+                </a:solidFill>
+                <a:latin typeface="Courier"/>
+              </a:rPr>
+              <a:t>y=</a:t>
+            </a:r>
+            <a:r>
+              <a:rPr sz="1800">
+                <a:latin typeface="Courier"/>
+              </a:rPr>
+              <a:t>height_inches)) </a:t>
+            </a:r>
+            <a:r>
+              <a:rPr sz="1800">
+                <a:solidFill>
+                  <a:srgbClr val="666666"/>
+                </a:solidFill>
+                <a:latin typeface="Courier"/>
+              </a:rPr>
+              <a:t>+</a:t>
+            </a:r>
+            <a:r>
+              <a:rPr sz="1800">
+                <a:solidFill>
+                  <a:srgbClr val="4070A0"/>
+                </a:solidFill>
+                <a:latin typeface="Courier"/>
+              </a:rPr>
+              <a:t> </a:t>
+            </a:r>
+            <a:r>
+              <a:rPr sz="1800" b="1">
+                <a:solidFill>
+                  <a:srgbClr val="007020"/>
+                </a:solidFill>
+                <a:latin typeface="Courier"/>
+              </a:rPr>
+              <a:t>geom_point</a:t>
+            </a:r>
+            <a:r>
+              <a:rPr sz="1800">
+                <a:latin typeface="Courier"/>
+              </a:rPr>
+              <a:t>() </a:t>
+            </a:r>
+            <a:r>
+              <a:rPr sz="1800">
+                <a:solidFill>
+                  <a:srgbClr val="666666"/>
+                </a:solidFill>
+                <a:latin typeface="Courier"/>
+              </a:rPr>
+              <a:t>+</a:t>
+            </a:r>
+            <a:r>
+              <a:rPr sz="1800">
+                <a:solidFill>
+                  <a:srgbClr val="4070A0"/>
+                </a:solidFill>
+                <a:latin typeface="Courier"/>
+              </a:rPr>
+              <a:t> </a:t>
+            </a:r>
+            <a:r>
+              <a:rPr sz="1800" b="1">
+                <a:solidFill>
+                  <a:srgbClr val="007020"/>
+                </a:solidFill>
+                <a:latin typeface="Courier"/>
+              </a:rPr>
+              <a:t>ggtitle</a:t>
+            </a:r>
+            <a:r>
+              <a:rPr sz="1800">
+                <a:latin typeface="Courier"/>
+              </a:rPr>
+              <a:t>(</a:t>
+            </a:r>
+            <a:r>
+              <a:rPr sz="1800">
+                <a:solidFill>
+                  <a:srgbClr val="4070A0"/>
+                </a:solidFill>
+                <a:latin typeface="Courier"/>
+              </a:rPr>
+              <a:t>"Height versus starting year"</a:t>
+            </a:r>
+            <a:r>
+              <a:rPr sz="1800">
+                <a:latin typeface="Courier"/>
+              </a:rPr>
+              <a:t>)</a:t>
+            </a:r>
+          </a:p>
+          <a:p>
+            <a:pPr lvl="0" marL="1270000" indent="0">
+              <a:buNone/>
+            </a:pPr>
+            <a:r>
+              <a:rPr sz="1800">
+                <a:latin typeface="Courier"/>
+              </a:rPr>
               <a:t>## Warning: Removed 1 rows containing missing values (geom_point).</a:t>
             </a:r>
           </a:p>
@@ -3522,7 +4192,7 @@
 </p:sld>
 </file>
 
-<file path=ppt/slides/slide14.xml><?xml version="1.0" encoding="utf-8"?>
+<file path=ppt/slides/slide16.xml><?xml version="1.0" encoding="utf-8"?>
 <p:sld xmlns:a="http://schemas.openxmlformats.org/drawingml/2006/main" xmlns:r="http://schemas.openxmlformats.org/officeDocument/2006/relationships" xmlns:p="http://schemas.openxmlformats.org/presentationml/2006/main">
   <p:cSld>
     <p:spTree>
@@ -3574,153 +4244,6 @@
 </p:sld>
 </file>
 
-<file path=ppt/slides/slide15.xml><?xml version="1.0" encoding="utf-8"?>
-<p:sld xmlns:a="http://schemas.openxmlformats.org/drawingml/2006/main" xmlns:r="http://schemas.openxmlformats.org/officeDocument/2006/relationships" xmlns:p="http://schemas.openxmlformats.org/presentationml/2006/main">
-  <p:cSld>
-    <p:spTree>
-      <p:nvGrpSpPr>
-        <p:cNvPr id="1" name=""/>
-        <p:cNvGrpSpPr/>
-        <p:nvPr/>
-      </p:nvGrpSpPr>
-      <p:grpSpPr>
-        <a:xfrm>
-          <a:off x="0" y="0"/>
-          <a:ext cx="0" cy="0"/>
-          <a:chOff x="0" y="0"/>
-          <a:chExt cx="0" cy="0"/>
-        </a:xfrm>
-      </p:grpSpPr>
-      <p:sp>
-        <p:nvSpPr>
-          <p:cNvPr id="3" name="Content Placeholder 2"/>
-          <p:cNvSpPr>
-            <a:spLocks noGrp="1"/>
-          </p:cNvSpPr>
-          <p:nvPr>
-            <p:ph idx="1"/>
-          </p:nvPr>
-        </p:nvSpPr>
-        <p:spPr/>
-        <p:txBody>
-          <a:bodyPr/>
-          <a:lstStyle/>
-          <a:p>
-            <a:pPr lvl="0" marL="0" indent="0">
-              <a:buNone/>
-            </a:pPr>
-            <a:r>
-              <a:rPr/>
-              <a:t> ## Question 8 3D plot of height versus weight, colored by position</a:t>
-            </a:r>
-          </a:p>
-        </p:txBody>
-      </p:sp>
-    </p:spTree>
-  </p:cSld>
-</p:sld>
-</file>
-
-<file path=ppt/slides/slide16.xml><?xml version="1.0" encoding="utf-8"?>
-<p:sld xmlns:a="http://schemas.openxmlformats.org/drawingml/2006/main" xmlns:r="http://schemas.openxmlformats.org/officeDocument/2006/relationships" xmlns:p="http://schemas.openxmlformats.org/presentationml/2006/main">
-  <p:cSld>
-    <p:spTree>
-      <p:nvGrpSpPr>
-        <p:cNvPr id="1" name=""/>
-        <p:cNvGrpSpPr/>
-        <p:nvPr/>
-      </p:nvGrpSpPr>
-      <p:grpSpPr>
-        <a:xfrm>
-          <a:off x="0" y="0"/>
-          <a:ext cx="0" cy="0"/>
-          <a:chOff x="0" y="0"/>
-          <a:chExt cx="0" cy="0"/>
-        </a:xfrm>
-      </p:grpSpPr>
-      <p:sp>
-        <p:nvSpPr>
-          <p:cNvPr id="2" name="Title 1"/>
-          <p:cNvSpPr>
-            <a:spLocks noGrp="1"/>
-          </p:cNvSpPr>
-          <p:nvPr>
-            <p:ph type="title"/>
-          </p:nvPr>
-        </p:nvSpPr>
-        <p:spPr/>
-        <p:txBody>
-          <a:bodyPr/>
-          <a:lstStyle/>
-          <a:p>
-            <a:pPr lvl="0" marL="0" indent="0">
-              <a:buNone/>
-            </a:pPr>
-            <a:r>
-              <a:rPr/>
-              <a:t>Slide</a:t>
-            </a:r>
-            <a:r>
-              <a:rPr/>
-              <a:t> </a:t>
-            </a:r>
-            <a:r>
-              <a:rPr/>
-              <a:t>with</a:t>
-            </a:r>
-            <a:r>
-              <a:rPr/>
-              <a:t> </a:t>
-            </a:r>
-            <a:r>
-              <a:rPr/>
-              <a:t>Bullets</a:t>
-            </a:r>
-          </a:p>
-        </p:txBody>
-      </p:sp>
-      <p:sp>
-        <p:nvSpPr>
-          <p:cNvPr id="3" name="Content Placeholder 2"/>
-          <p:cNvSpPr>
-            <a:spLocks noGrp="1"/>
-          </p:cNvSpPr>
-          <p:nvPr>
-            <p:ph idx="1"/>
-          </p:nvPr>
-        </p:nvSpPr>
-        <p:spPr/>
-        <p:txBody>
-          <a:bodyPr/>
-          <a:lstStyle/>
-          <a:p>
-            <a:pPr lvl="1"/>
-            <a:r>
-              <a:rPr/>
-              <a:t>Bullet 1</a:t>
-            </a:r>
-          </a:p>
-          <a:p>
-            <a:pPr lvl="1"/>
-            <a:r>
-              <a:rPr/>
-              <a:t>Bullet 2</a:t>
-            </a:r>
-          </a:p>
-          <a:p>
-            <a:pPr lvl="1"/>
-            <a:r>
-              <a:rPr/>
-              <a:t>Bullet 3</a:t>
-            </a:r>
-          </a:p>
-        </p:txBody>
-      </p:sp>
-    </p:spTree>
-  </p:cSld>
-</p:sld>
-</file>
-
 <file path=ppt/slides/slide17.xml><?xml version="1.0" encoding="utf-8"?>
 <p:sld xmlns:a="http://schemas.openxmlformats.org/drawingml/2006/main" xmlns:r="http://schemas.openxmlformats.org/officeDocument/2006/relationships" xmlns:p="http://schemas.openxmlformats.org/presentationml/2006/main">
   <p:cSld>
@@ -3740,6 +4263,153 @@
       </p:grpSpPr>
       <p:sp>
         <p:nvSpPr>
+          <p:cNvPr id="3" name="Content Placeholder 2"/>
+          <p:cNvSpPr>
+            <a:spLocks noGrp="1"/>
+          </p:cNvSpPr>
+          <p:nvPr>
+            <p:ph idx="1"/>
+          </p:nvPr>
+        </p:nvSpPr>
+        <p:spPr/>
+        <p:txBody>
+          <a:bodyPr/>
+          <a:lstStyle/>
+          <a:p>
+            <a:pPr lvl="0" marL="0" indent="0">
+              <a:buNone/>
+            </a:pPr>
+            <a:r>
+              <a:rPr/>
+              <a:t> ## Question 8 3D plot of height versus weight, colored by position</a:t>
+            </a:r>
+          </a:p>
+        </p:txBody>
+      </p:sp>
+    </p:spTree>
+  </p:cSld>
+</p:sld>
+</file>
+
+<file path=ppt/slides/slide18.xml><?xml version="1.0" encoding="utf-8"?>
+<p:sld xmlns:a="http://schemas.openxmlformats.org/drawingml/2006/main" xmlns:r="http://schemas.openxmlformats.org/officeDocument/2006/relationships" xmlns:p="http://schemas.openxmlformats.org/presentationml/2006/main">
+  <p:cSld>
+    <p:spTree>
+      <p:nvGrpSpPr>
+        <p:cNvPr id="1" name=""/>
+        <p:cNvGrpSpPr/>
+        <p:nvPr/>
+      </p:nvGrpSpPr>
+      <p:grpSpPr>
+        <a:xfrm>
+          <a:off x="0" y="0"/>
+          <a:ext cx="0" cy="0"/>
+          <a:chOff x="0" y="0"/>
+          <a:chExt cx="0" cy="0"/>
+        </a:xfrm>
+      </p:grpSpPr>
+      <p:sp>
+        <p:nvSpPr>
+          <p:cNvPr id="2" name="Title 1"/>
+          <p:cNvSpPr>
+            <a:spLocks noGrp="1"/>
+          </p:cNvSpPr>
+          <p:nvPr>
+            <p:ph type="title"/>
+          </p:nvPr>
+        </p:nvSpPr>
+        <p:spPr/>
+        <p:txBody>
+          <a:bodyPr/>
+          <a:lstStyle/>
+          <a:p>
+            <a:pPr lvl="0" marL="0" indent="0">
+              <a:buNone/>
+            </a:pPr>
+            <a:r>
+              <a:rPr/>
+              <a:t>Slide</a:t>
+            </a:r>
+            <a:r>
+              <a:rPr/>
+              <a:t> </a:t>
+            </a:r>
+            <a:r>
+              <a:rPr/>
+              <a:t>with</a:t>
+            </a:r>
+            <a:r>
+              <a:rPr/>
+              <a:t> </a:t>
+            </a:r>
+            <a:r>
+              <a:rPr/>
+              <a:t>Bullets</a:t>
+            </a:r>
+          </a:p>
+        </p:txBody>
+      </p:sp>
+      <p:sp>
+        <p:nvSpPr>
+          <p:cNvPr id="3" name="Content Placeholder 2"/>
+          <p:cNvSpPr>
+            <a:spLocks noGrp="1"/>
+          </p:cNvSpPr>
+          <p:nvPr>
+            <p:ph idx="1"/>
+          </p:nvPr>
+        </p:nvSpPr>
+        <p:spPr/>
+        <p:txBody>
+          <a:bodyPr/>
+          <a:lstStyle/>
+          <a:p>
+            <a:pPr lvl="1"/>
+            <a:r>
+              <a:rPr/>
+              <a:t>Bullet 1</a:t>
+            </a:r>
+          </a:p>
+          <a:p>
+            <a:pPr lvl="1"/>
+            <a:r>
+              <a:rPr/>
+              <a:t>Bullet 2</a:t>
+            </a:r>
+          </a:p>
+          <a:p>
+            <a:pPr lvl="1"/>
+            <a:r>
+              <a:rPr/>
+              <a:t>Bullet 3</a:t>
+            </a:r>
+          </a:p>
+        </p:txBody>
+      </p:sp>
+    </p:spTree>
+  </p:cSld>
+</p:sld>
+</file>
+
+<file path=ppt/slides/slide19.xml><?xml version="1.0" encoding="utf-8"?>
+<p:sld xmlns:a="http://schemas.openxmlformats.org/drawingml/2006/main" xmlns:r="http://schemas.openxmlformats.org/officeDocument/2006/relationships" xmlns:p="http://schemas.openxmlformats.org/presentationml/2006/main">
+  <p:cSld>
+    <p:spTree>
+      <p:nvGrpSpPr>
+        <p:cNvPr id="1" name=""/>
+        <p:cNvGrpSpPr/>
+        <p:nvPr/>
+      </p:nvGrpSpPr>
+      <p:grpSpPr>
+        <a:xfrm>
+          <a:off x="0" y="0"/>
+          <a:ext cx="0" cy="0"/>
+          <a:chOff x="0" y="0"/>
+          <a:chExt cx="0" cy="0"/>
+        </a:xfrm>
+      </p:grpSpPr>
+      <p:sp>
+        <p:nvSpPr>
           <p:cNvPr id="2" name="Title 1"/>
           <p:cNvSpPr>
             <a:spLocks noGrp="1"/>
@@ -3845,7 +4515,83 @@
 </p:sld>
 </file>
 
-<file path=ppt/slides/slide18.xml><?xml version="1.0" encoding="utf-8"?>
+<file path=ppt/slides/slide2.xml><?xml version="1.0" encoding="utf-8"?>
+<p:sld xmlns:a="http://schemas.openxmlformats.org/drawingml/2006/main" xmlns:r="http://schemas.openxmlformats.org/officeDocument/2006/relationships" xmlns:p="http://schemas.openxmlformats.org/presentationml/2006/main">
+  <p:cSld>
+    <p:spTree>
+      <p:nvGrpSpPr>
+        <p:cNvPr id="1" name=""/>
+        <p:cNvGrpSpPr/>
+        <p:nvPr/>
+      </p:nvGrpSpPr>
+      <p:grpSpPr>
+        <a:xfrm>
+          <a:off x="0" y="0"/>
+          <a:ext cx="0" cy="0"/>
+          <a:chOff x="0" y="0"/>
+          <a:chExt cx="0" cy="0"/>
+        </a:xfrm>
+      </p:grpSpPr>
+      <p:sp>
+        <p:nvSpPr>
+          <p:cNvPr id="3" name="Content Placeholder 2"/>
+          <p:cNvSpPr>
+            <a:spLocks noGrp="1"/>
+          </p:cNvSpPr>
+          <p:nvPr>
+            <p:ph idx="1"/>
+          </p:nvPr>
+        </p:nvSpPr>
+        <p:spPr/>
+        <p:txBody>
+          <a:bodyPr/>
+          <a:lstStyle/>
+          <a:p>
+            <a:pPr lvl="0" marL="1270000" indent="0">
+              <a:buNone/>
+            </a:pPr>
+            <a:r>
+              <a:rPr sz="1800">
+                <a:latin typeface="Courier"/>
+              </a:rPr>
+              <a:t>## 
+## Attaching package: 'dplyr'</a:t>
+            </a:r>
+          </a:p>
+          <a:p>
+            <a:pPr lvl="0" marL="1270000" indent="0">
+              <a:buNone/>
+            </a:pPr>
+            <a:r>
+              <a:rPr sz="1800">
+                <a:latin typeface="Courier"/>
+              </a:rPr>
+              <a:t>## The following objects are masked from 'package:stats':
+## 
+##     filter, lag</a:t>
+            </a:r>
+          </a:p>
+          <a:p>
+            <a:pPr lvl="0" marL="1270000" indent="0">
+              <a:buNone/>
+            </a:pPr>
+            <a:r>
+              <a:rPr sz="1800">
+                <a:latin typeface="Courier"/>
+              </a:rPr>
+              <a:t>## The following objects are masked from 'package:base':
+## 
+##     intersect, setdiff, setequal, union</a:t>
+            </a:r>
+          </a:p>
+        </p:txBody>
+      </p:sp>
+    </p:spTree>
+  </p:cSld>
+</p:sld>
+</file>
+
+<file path=ppt/slides/slide20.xml><?xml version="1.0" encoding="utf-8"?>
 <p:sld xmlns:a="http://schemas.openxmlformats.org/drawingml/2006/main" xmlns:r="http://schemas.openxmlformats.org/officeDocument/2006/relationships" xmlns:p="http://schemas.openxmlformats.org/presentationml/2006/main">
   <p:cSld>
     <p:spTree>
@@ -3933,82 +4679,6 @@
           </a:ln>
         </p:spPr>
       </p:pic>
-    </p:spTree>
-  </p:cSld>
-</p:sld>
-</file>
-
-<file path=ppt/slides/slide2.xml><?xml version="1.0" encoding="utf-8"?>
-<p:sld xmlns:a="http://schemas.openxmlformats.org/drawingml/2006/main" xmlns:r="http://schemas.openxmlformats.org/officeDocument/2006/relationships" xmlns:p="http://schemas.openxmlformats.org/presentationml/2006/main">
-  <p:cSld>
-    <p:spTree>
-      <p:nvGrpSpPr>
-        <p:cNvPr id="1" name=""/>
-        <p:cNvGrpSpPr/>
-        <p:nvPr/>
-      </p:nvGrpSpPr>
-      <p:grpSpPr>
-        <a:xfrm>
-          <a:off x="0" y="0"/>
-          <a:ext cx="0" cy="0"/>
-          <a:chOff x="0" y="0"/>
-          <a:chExt cx="0" cy="0"/>
-        </a:xfrm>
-      </p:grpSpPr>
-      <p:sp>
-        <p:nvSpPr>
-          <p:cNvPr id="3" name="Content Placeholder 2"/>
-          <p:cNvSpPr>
-            <a:spLocks noGrp="1"/>
-          </p:cNvSpPr>
-          <p:nvPr>
-            <p:ph idx="1"/>
-          </p:nvPr>
-        </p:nvSpPr>
-        <p:spPr/>
-        <p:txBody>
-          <a:bodyPr/>
-          <a:lstStyle/>
-          <a:p>
-            <a:pPr lvl="0" marL="1270000" indent="0">
-              <a:buNone/>
-            </a:pPr>
-            <a:r>
-              <a:rPr sz="1800">
-                <a:latin typeface="Courier"/>
-              </a:rPr>
-              <a:t>## 
-## Attaching package: 'dplyr'</a:t>
-            </a:r>
-          </a:p>
-          <a:p>
-            <a:pPr lvl="0" marL="1270000" indent="0">
-              <a:buNone/>
-            </a:pPr>
-            <a:r>
-              <a:rPr sz="1800">
-                <a:latin typeface="Courier"/>
-              </a:rPr>
-              <a:t>## The following objects are masked from 'package:stats':
-## 
-##     filter, lag</a:t>
-            </a:r>
-          </a:p>
-          <a:p>
-            <a:pPr lvl="0" marL="1270000" indent="0">
-              <a:buNone/>
-            </a:pPr>
-            <a:r>
-              <a:rPr sz="1800">
-                <a:latin typeface="Courier"/>
-              </a:rPr>
-              <a:t>## The following objects are masked from 'package:base':
-## 
-##     intersect, setdiff, setequal, union</a:t>
-            </a:r>
-          </a:p>
-        </p:txBody>
-      </p:sp>
     </p:spTree>
   </p:cSld>
 </p:sld>
@@ -4448,6 +5118,338 @@
               <a:rPr sz="1800">
                 <a:latin typeface="Courier"/>
               </a:rPr>
+              <a:t>BBall </a:t>
+            </a:r>
+            <a:r>
+              <a:rPr sz="1800">
+                <a:solidFill>
+                  <a:srgbClr val="666666"/>
+                </a:solidFill>
+                <a:latin typeface="Courier"/>
+              </a:rPr>
+              <a:t>%&gt;%</a:t>
+            </a:r>
+            <a:r>
+              <a:rPr sz="1800">
+                <a:solidFill>
+                  <a:srgbClr val="4070A0"/>
+                </a:solidFill>
+                <a:latin typeface="Courier"/>
+              </a:rPr>
+              <a:t> </a:t>
+            </a:r>
+            <a:r>
+              <a:rPr sz="1800" b="1">
+                <a:solidFill>
+                  <a:srgbClr val="007020"/>
+                </a:solidFill>
+                <a:latin typeface="Courier"/>
+              </a:rPr>
+              <a:t>filter</a:t>
+            </a:r>
+            <a:r>
+              <a:rPr sz="1800">
+                <a:latin typeface="Courier"/>
+              </a:rPr>
+              <a:t>(position </a:t>
+            </a:r>
+            <a:r>
+              <a:rPr sz="1800">
+                <a:solidFill>
+                  <a:srgbClr val="666666"/>
+                </a:solidFill>
+                <a:latin typeface="Courier"/>
+              </a:rPr>
+              <a:t>==</a:t>
+            </a:r>
+            <a:r>
+              <a:rPr sz="1800">
+                <a:solidFill>
+                  <a:srgbClr val="4070A0"/>
+                </a:solidFill>
+                <a:latin typeface="Courier"/>
+              </a:rPr>
+              <a:t> 'C'</a:t>
+            </a:r>
+            <a:r>
+              <a:rPr sz="1800">
+                <a:latin typeface="Courier"/>
+              </a:rPr>
+              <a:t> </a:t>
+            </a:r>
+            <a:r>
+              <a:rPr sz="1800">
+                <a:solidFill>
+                  <a:srgbClr val="666666"/>
+                </a:solidFill>
+                <a:latin typeface="Courier"/>
+              </a:rPr>
+              <a:t>|</a:t>
+            </a:r>
+            <a:r>
+              <a:rPr sz="1800">
+                <a:solidFill>
+                  <a:srgbClr val="4070A0"/>
+                </a:solidFill>
+                <a:latin typeface="Courier"/>
+              </a:rPr>
+              <a:t> </a:t>
+            </a:r>
+            <a:r>
+              <a:rPr sz="1800">
+                <a:latin typeface="Courier"/>
+              </a:rPr>
+              <a:t>position </a:t>
+            </a:r>
+            <a:r>
+              <a:rPr sz="1800">
+                <a:solidFill>
+                  <a:srgbClr val="666666"/>
+                </a:solidFill>
+                <a:latin typeface="Courier"/>
+              </a:rPr>
+              <a:t>==</a:t>
+            </a:r>
+            <a:r>
+              <a:rPr sz="1800">
+                <a:solidFill>
+                  <a:srgbClr val="4070A0"/>
+                </a:solidFill>
+                <a:latin typeface="Courier"/>
+              </a:rPr>
+              <a:t> 'F'</a:t>
+            </a:r>
+            <a:r>
+              <a:rPr sz="1800">
+                <a:latin typeface="Courier"/>
+              </a:rPr>
+              <a:t>) </a:t>
+            </a:r>
+            <a:r>
+              <a:rPr sz="1800">
+                <a:solidFill>
+                  <a:srgbClr val="666666"/>
+                </a:solidFill>
+                <a:latin typeface="Courier"/>
+              </a:rPr>
+              <a:t>%&gt;%</a:t>
+            </a:r>
+            <a:r>
+              <a:rPr sz="1800">
+                <a:solidFill>
+                  <a:srgbClr val="4070A0"/>
+                </a:solidFill>
+                <a:latin typeface="Courier"/>
+              </a:rPr>
+              <a:t> </a:t>
+            </a:r>
+            <a:r>
+              <a:rPr sz="1800" b="1">
+                <a:solidFill>
+                  <a:srgbClr val="007020"/>
+                </a:solidFill>
+                <a:latin typeface="Courier"/>
+              </a:rPr>
+              <a:t>ggplot</a:t>
+            </a:r>
+            <a:r>
+              <a:rPr sz="1800">
+                <a:latin typeface="Courier"/>
+              </a:rPr>
+              <a:t>(</a:t>
+            </a:r>
+            <a:r>
+              <a:rPr sz="1800" b="1">
+                <a:solidFill>
+                  <a:srgbClr val="007020"/>
+                </a:solidFill>
+                <a:latin typeface="Courier"/>
+              </a:rPr>
+              <a:t>aes</a:t>
+            </a:r>
+            <a:r>
+              <a:rPr sz="1800">
+                <a:latin typeface="Courier"/>
+              </a:rPr>
+              <a:t>(</a:t>
+            </a:r>
+            <a:r>
+              <a:rPr sz="1800">
+                <a:solidFill>
+                  <a:srgbClr val="902000"/>
+                </a:solidFill>
+                <a:latin typeface="Courier"/>
+              </a:rPr>
+              <a:t>x=</a:t>
+            </a:r>
+            <a:r>
+              <a:rPr sz="1800">
+                <a:latin typeface="Courier"/>
+              </a:rPr>
+              <a:t>weight)) </a:t>
+            </a:r>
+            <a:r>
+              <a:rPr sz="1800">
+                <a:solidFill>
+                  <a:srgbClr val="666666"/>
+                </a:solidFill>
+                <a:latin typeface="Courier"/>
+              </a:rPr>
+              <a:t>+</a:t>
+            </a:r>
+            <a:r>
+              <a:rPr sz="1800">
+                <a:solidFill>
+                  <a:srgbClr val="4070A0"/>
+                </a:solidFill>
+                <a:latin typeface="Courier"/>
+              </a:rPr>
+              <a:t> </a:t>
+            </a:r>
+            <a:r>
+              <a:rPr sz="1800" b="1">
+                <a:solidFill>
+                  <a:srgbClr val="007020"/>
+                </a:solidFill>
+                <a:latin typeface="Courier"/>
+              </a:rPr>
+              <a:t>geom_histogram</a:t>
+            </a:r>
+            <a:r>
+              <a:rPr sz="1800">
+                <a:latin typeface="Courier"/>
+              </a:rPr>
+              <a:t>(</a:t>
+            </a:r>
+            <a:r>
+              <a:rPr sz="1800">
+                <a:solidFill>
+                  <a:srgbClr val="902000"/>
+                </a:solidFill>
+                <a:latin typeface="Courier"/>
+              </a:rPr>
+              <a:t>bins=</a:t>
+            </a:r>
+            <a:r>
+              <a:rPr sz="1800">
+                <a:solidFill>
+                  <a:srgbClr val="40A070"/>
+                </a:solidFill>
+                <a:latin typeface="Courier"/>
+              </a:rPr>
+              <a:t>20</a:t>
+            </a:r>
+            <a:r>
+              <a:rPr sz="1800">
+                <a:latin typeface="Courier"/>
+              </a:rPr>
+              <a:t>) </a:t>
+            </a:r>
+            <a:r>
+              <a:rPr sz="1800">
+                <a:solidFill>
+                  <a:srgbClr val="666666"/>
+                </a:solidFill>
+                <a:latin typeface="Courier"/>
+              </a:rPr>
+              <a:t>+</a:t>
+            </a:r>
+            <a:r>
+              <a:rPr sz="1800">
+                <a:solidFill>
+                  <a:srgbClr val="4070A0"/>
+                </a:solidFill>
+                <a:latin typeface="Courier"/>
+              </a:rPr>
+              <a:t> </a:t>
+            </a:r>
+            <a:r>
+              <a:rPr sz="1800" b="1">
+                <a:solidFill>
+                  <a:srgbClr val="007020"/>
+                </a:solidFill>
+                <a:latin typeface="Courier"/>
+              </a:rPr>
+              <a:t>ggtitle</a:t>
+            </a:r>
+            <a:r>
+              <a:rPr sz="1800">
+                <a:latin typeface="Courier"/>
+              </a:rPr>
+              <a:t>(</a:t>
+            </a:r>
+            <a:r>
+              <a:rPr sz="1800">
+                <a:solidFill>
+                  <a:srgbClr val="4070A0"/>
+                </a:solidFill>
+                <a:latin typeface="Courier"/>
+              </a:rPr>
+              <a:t>"Distribution of Weight for Centers and Forwards"</a:t>
+            </a:r>
+            <a:r>
+              <a:rPr sz="1800">
+                <a:latin typeface="Courier"/>
+              </a:rPr>
+              <a:t>) </a:t>
+            </a:r>
+            <a:r>
+              <a:rPr sz="1800">
+                <a:solidFill>
+                  <a:srgbClr val="666666"/>
+                </a:solidFill>
+                <a:latin typeface="Courier"/>
+              </a:rPr>
+              <a:t>+</a:t>
+            </a:r>
+            <a:r>
+              <a:rPr sz="1800">
+                <a:solidFill>
+                  <a:srgbClr val="4070A0"/>
+                </a:solidFill>
+                <a:latin typeface="Courier"/>
+              </a:rPr>
+              <a:t> </a:t>
+            </a:r>
+            <a:r>
+              <a:rPr sz="1800" b="1">
+                <a:solidFill>
+                  <a:srgbClr val="007020"/>
+                </a:solidFill>
+                <a:latin typeface="Courier"/>
+              </a:rPr>
+              <a:t>facet_wrap</a:t>
+            </a:r>
+            <a:r>
+              <a:rPr sz="1800">
+                <a:latin typeface="Courier"/>
+              </a:rPr>
+              <a:t>(</a:t>
+            </a:r>
+            <a:r>
+              <a:rPr sz="1800">
+                <a:solidFill>
+                  <a:srgbClr val="666666"/>
+                </a:solidFill>
+                <a:latin typeface="Courier"/>
+              </a:rPr>
+              <a:t>~</a:t>
+            </a:r>
+            <a:r>
+              <a:rPr sz="1800">
+                <a:latin typeface="Courier"/>
+              </a:rPr>
+              <a:t>position)</a:t>
+            </a:r>
+          </a:p>
+          <a:p>
+            <a:pPr lvl="0" marL="1270000" indent="0">
+              <a:buNone/>
+            </a:pPr>
+            <a:r>
+              <a:rPr sz="1800">
+                <a:latin typeface="Courier"/>
+              </a:rPr>
               <a:t>## Warning: Removed 3 rows containing non-finite values (stat_bin).</a:t>
             </a:r>
           </a:p>
@@ -4580,7 +5582,339 @@
             </a:pPr>
             <a:r>
               <a:rPr/>
-              <a:t>Compare the distribution of the height of centers with that of the height of forwards </a:t>
+              <a:t>Compare the distribution of the height of centers with that of the height of forwards</a:t>
+            </a:r>
+          </a:p>
+          <a:p>
+            <a:pPr lvl="0" marL="1270000" indent="0">
+              <a:buNone/>
+            </a:pPr>
+            <a:r>
+              <a:rPr sz="1800">
+                <a:latin typeface="Courier"/>
+              </a:rPr>
+              <a:t>BBall </a:t>
+            </a:r>
+            <a:r>
+              <a:rPr sz="1800">
+                <a:solidFill>
+                  <a:srgbClr val="666666"/>
+                </a:solidFill>
+                <a:latin typeface="Courier"/>
+              </a:rPr>
+              <a:t>%&gt;%</a:t>
+            </a:r>
+            <a:r>
+              <a:rPr sz="1800">
+                <a:solidFill>
+                  <a:srgbClr val="4070A0"/>
+                </a:solidFill>
+                <a:latin typeface="Courier"/>
+              </a:rPr>
+              <a:t> </a:t>
+            </a:r>
+            <a:r>
+              <a:rPr sz="1800" b="1">
+                <a:solidFill>
+                  <a:srgbClr val="007020"/>
+                </a:solidFill>
+                <a:latin typeface="Courier"/>
+              </a:rPr>
+              <a:t>filter</a:t>
+            </a:r>
+            <a:r>
+              <a:rPr sz="1800">
+                <a:latin typeface="Courier"/>
+              </a:rPr>
+              <a:t>(position </a:t>
+            </a:r>
+            <a:r>
+              <a:rPr sz="1800">
+                <a:solidFill>
+                  <a:srgbClr val="666666"/>
+                </a:solidFill>
+                <a:latin typeface="Courier"/>
+              </a:rPr>
+              <a:t>==</a:t>
+            </a:r>
+            <a:r>
+              <a:rPr sz="1800">
+                <a:solidFill>
+                  <a:srgbClr val="4070A0"/>
+                </a:solidFill>
+                <a:latin typeface="Courier"/>
+              </a:rPr>
+              <a:t> 'C'</a:t>
+            </a:r>
+            <a:r>
+              <a:rPr sz="1800">
+                <a:latin typeface="Courier"/>
+              </a:rPr>
+              <a:t> </a:t>
+            </a:r>
+            <a:r>
+              <a:rPr sz="1800">
+                <a:solidFill>
+                  <a:srgbClr val="666666"/>
+                </a:solidFill>
+                <a:latin typeface="Courier"/>
+              </a:rPr>
+              <a:t>|</a:t>
+            </a:r>
+            <a:r>
+              <a:rPr sz="1800">
+                <a:solidFill>
+                  <a:srgbClr val="4070A0"/>
+                </a:solidFill>
+                <a:latin typeface="Courier"/>
+              </a:rPr>
+              <a:t> </a:t>
+            </a:r>
+            <a:r>
+              <a:rPr sz="1800">
+                <a:latin typeface="Courier"/>
+              </a:rPr>
+              <a:t>position </a:t>
+            </a:r>
+            <a:r>
+              <a:rPr sz="1800">
+                <a:solidFill>
+                  <a:srgbClr val="666666"/>
+                </a:solidFill>
+                <a:latin typeface="Courier"/>
+              </a:rPr>
+              <a:t>==</a:t>
+            </a:r>
+            <a:r>
+              <a:rPr sz="1800">
+                <a:solidFill>
+                  <a:srgbClr val="4070A0"/>
+                </a:solidFill>
+                <a:latin typeface="Courier"/>
+              </a:rPr>
+              <a:t> 'F'</a:t>
+            </a:r>
+            <a:r>
+              <a:rPr sz="1800">
+                <a:latin typeface="Courier"/>
+              </a:rPr>
+              <a:t>) </a:t>
+            </a:r>
+            <a:r>
+              <a:rPr sz="1800">
+                <a:solidFill>
+                  <a:srgbClr val="666666"/>
+                </a:solidFill>
+                <a:latin typeface="Courier"/>
+              </a:rPr>
+              <a:t>%&gt;%</a:t>
+            </a:r>
+            <a:r>
+              <a:rPr sz="1800">
+                <a:solidFill>
+                  <a:srgbClr val="4070A0"/>
+                </a:solidFill>
+                <a:latin typeface="Courier"/>
+              </a:rPr>
+              <a:t> </a:t>
+            </a:r>
+            <a:r>
+              <a:rPr sz="1800" b="1">
+                <a:solidFill>
+                  <a:srgbClr val="007020"/>
+                </a:solidFill>
+                <a:latin typeface="Courier"/>
+              </a:rPr>
+              <a:t>ggplot</a:t>
+            </a:r>
+            <a:r>
+              <a:rPr sz="1800">
+                <a:latin typeface="Courier"/>
+              </a:rPr>
+              <a:t>(</a:t>
+            </a:r>
+            <a:r>
+              <a:rPr sz="1800" b="1">
+                <a:solidFill>
+                  <a:srgbClr val="007020"/>
+                </a:solidFill>
+                <a:latin typeface="Courier"/>
+              </a:rPr>
+              <a:t>aes</a:t>
+            </a:r>
+            <a:r>
+              <a:rPr sz="1800">
+                <a:latin typeface="Courier"/>
+              </a:rPr>
+              <a:t>(</a:t>
+            </a:r>
+            <a:r>
+              <a:rPr sz="1800">
+                <a:solidFill>
+                  <a:srgbClr val="902000"/>
+                </a:solidFill>
+                <a:latin typeface="Courier"/>
+              </a:rPr>
+              <a:t>x=</a:t>
+            </a:r>
+            <a:r>
+              <a:rPr sz="1800">
+                <a:latin typeface="Courier"/>
+              </a:rPr>
+              <a:t>height_inches)) </a:t>
+            </a:r>
+            <a:r>
+              <a:rPr sz="1800">
+                <a:solidFill>
+                  <a:srgbClr val="666666"/>
+                </a:solidFill>
+                <a:latin typeface="Courier"/>
+              </a:rPr>
+              <a:t>+</a:t>
+            </a:r>
+            <a:r>
+              <a:rPr sz="1800">
+                <a:solidFill>
+                  <a:srgbClr val="4070A0"/>
+                </a:solidFill>
+                <a:latin typeface="Courier"/>
+              </a:rPr>
+              <a:t> </a:t>
+            </a:r>
+            <a:r>
+              <a:rPr sz="1800" b="1">
+                <a:solidFill>
+                  <a:srgbClr val="007020"/>
+                </a:solidFill>
+                <a:latin typeface="Courier"/>
+              </a:rPr>
+              <a:t>geom_histogram</a:t>
+            </a:r>
+            <a:r>
+              <a:rPr sz="1800">
+                <a:latin typeface="Courier"/>
+              </a:rPr>
+              <a:t>(</a:t>
+            </a:r>
+            <a:r>
+              <a:rPr sz="1800">
+                <a:solidFill>
+                  <a:srgbClr val="902000"/>
+                </a:solidFill>
+                <a:latin typeface="Courier"/>
+              </a:rPr>
+              <a:t>bins=</a:t>
+            </a:r>
+            <a:r>
+              <a:rPr sz="1800">
+                <a:solidFill>
+                  <a:srgbClr val="40A070"/>
+                </a:solidFill>
+                <a:latin typeface="Courier"/>
+              </a:rPr>
+              <a:t>20</a:t>
+            </a:r>
+            <a:r>
+              <a:rPr sz="1800">
+                <a:latin typeface="Courier"/>
+              </a:rPr>
+              <a:t>) </a:t>
+            </a:r>
+            <a:r>
+              <a:rPr sz="1800">
+                <a:solidFill>
+                  <a:srgbClr val="666666"/>
+                </a:solidFill>
+                <a:latin typeface="Courier"/>
+              </a:rPr>
+              <a:t>+</a:t>
+            </a:r>
+            <a:r>
+              <a:rPr sz="1800">
+                <a:solidFill>
+                  <a:srgbClr val="4070A0"/>
+                </a:solidFill>
+                <a:latin typeface="Courier"/>
+              </a:rPr>
+              <a:t> </a:t>
+            </a:r>
+            <a:r>
+              <a:rPr sz="1800" b="1">
+                <a:solidFill>
+                  <a:srgbClr val="007020"/>
+                </a:solidFill>
+                <a:latin typeface="Courier"/>
+              </a:rPr>
+              <a:t>ggtitle</a:t>
+            </a:r>
+            <a:r>
+              <a:rPr sz="1800">
+                <a:latin typeface="Courier"/>
+              </a:rPr>
+              <a:t>(</a:t>
+            </a:r>
+            <a:r>
+              <a:rPr sz="1800">
+                <a:solidFill>
+                  <a:srgbClr val="4070A0"/>
+                </a:solidFill>
+                <a:latin typeface="Courier"/>
+              </a:rPr>
+              <a:t>"Distribution of Height for Centers and Forwards"</a:t>
+            </a:r>
+            <a:r>
+              <a:rPr sz="1800">
+                <a:latin typeface="Courier"/>
+              </a:rPr>
+              <a:t>) </a:t>
+            </a:r>
+            <a:r>
+              <a:rPr sz="1800">
+                <a:solidFill>
+                  <a:srgbClr val="666666"/>
+                </a:solidFill>
+                <a:latin typeface="Courier"/>
+              </a:rPr>
+              <a:t>+</a:t>
+            </a:r>
+            <a:r>
+              <a:rPr sz="1800">
+                <a:solidFill>
+                  <a:srgbClr val="4070A0"/>
+                </a:solidFill>
+                <a:latin typeface="Courier"/>
+              </a:rPr>
+              <a:t> </a:t>
+            </a:r>
+            <a:r>
+              <a:rPr sz="1800" b="1">
+                <a:solidFill>
+                  <a:srgbClr val="007020"/>
+                </a:solidFill>
+                <a:latin typeface="Courier"/>
+              </a:rPr>
+              <a:t>facet_wrap</a:t>
+            </a:r>
+            <a:r>
+              <a:rPr sz="1800">
+                <a:latin typeface="Courier"/>
+              </a:rPr>
+              <a:t>(</a:t>
+            </a:r>
+            <a:r>
+              <a:rPr sz="1800">
+                <a:solidFill>
+                  <a:srgbClr val="666666"/>
+                </a:solidFill>
+                <a:latin typeface="Courier"/>
+              </a:rPr>
+              <a:t>~</a:t>
+            </a:r>
+            <a:r>
+              <a:rPr sz="1800">
+                <a:latin typeface="Courier"/>
+              </a:rPr>
+              <a:t>position)</a:t>
             </a:r>
           </a:p>
         </p:txBody>
@@ -4607,64 +5941,36 @@
           <a:chExt cx="0" cy="0"/>
         </a:xfrm>
       </p:grpSpPr>
-      <p:sp>
-        <p:nvSpPr>
-          <p:cNvPr id="2" name="Title 1"/>
-          <p:cNvSpPr>
-            <a:spLocks noGrp="1"/>
-          </p:cNvSpPr>
-          <p:nvPr>
-            <p:ph type="title"/>
-          </p:nvPr>
-        </p:nvSpPr>
-        <p:spPr/>
-        <p:txBody>
-          <a:bodyPr/>
-          <a:lstStyle/>
-          <a:p>
-            <a:pPr lvl="0" marL="0" indent="0">
-              <a:buNone/>
-            </a:pPr>
-            <a:r>
-              <a:rPr/>
-              <a:t>Question</a:t>
-            </a:r>
-            <a:r>
-              <a:rPr/>
-              <a:t> </a:t>
-            </a:r>
-            <a:r>
-              <a:rPr/>
-              <a:t>4</a:t>
-            </a:r>
-          </a:p>
-        </p:txBody>
-      </p:sp>
-      <p:sp>
-        <p:nvSpPr>
-          <p:cNvPr id="3" name="Content Placeholder 2"/>
-          <p:cNvSpPr>
-            <a:spLocks noGrp="1"/>
-          </p:cNvSpPr>
-          <p:nvPr>
-            <p:ph idx="1"/>
-          </p:nvPr>
-        </p:nvSpPr>
-        <p:spPr/>
-        <p:txBody>
-          <a:bodyPr/>
-          <a:lstStyle/>
-          <a:p>
-            <a:pPr lvl="0" marL="0" indent="0">
-              <a:buNone/>
-            </a:pPr>
-            <a:r>
-              <a:rPr/>
-              <a:t>Investigate distribution of height across all positions </a:t>
-            </a:r>
-          </a:p>
-        </p:txBody>
-      </p:sp>
+      <p:pic>
+        <p:nvPicPr>
+          <p:cNvPr descr="Richard_Palmer_LiveSession_2_files/figure-pptx/unnamed-chunk-4-1.png" id="0" name="Picture 1"/>
+          <p:cNvPicPr>
+            <a:picLocks noGrp="1" noChangeAspect="1"/>
+          </p:cNvPicPr>
+          <p:nvPr/>
+        </p:nvPicPr>
+        <p:blipFill>
+          <a:blip r:embed="rId2"/>
+          <a:stretch>
+            <a:fillRect/>
+          </a:stretch>
+        </p:blipFill>
+        <p:spPr bwMode="auto">
+          <a:xfrm>
+            <a:off x="1752600" y="1600200"/>
+            <a:ext cx="5651500" cy="4521200"/>
+          </a:xfrm>
+          <a:prstGeom prst="rect">
+            <a:avLst/>
+          </a:prstGeom>
+          <a:noFill/>
+          <a:ln w="9525">
+            <a:noFill/>
+            <a:headEnd/>
+            <a:tailEnd/>
+          </a:ln>
+        </p:spPr>
+      </p:pic>
     </p:spTree>
   </p:cSld>
 </p:sld>
@@ -4715,7 +6021,7 @@
             </a:r>
             <a:r>
               <a:rPr/>
-              <a:t>5</a:t>
+              <a:t>4</a:t>
             </a:r>
           </a:p>
         </p:txBody>
@@ -4740,7 +6046,7 @@
             </a:pPr>
             <a:r>
               <a:rPr/>
-              <a:t>Investigate how a players height is related to his weight</a:t>
+              <a:t>Investigate distribution of height across all positions</a:t>
             </a:r>
           </a:p>
           <a:p>
@@ -4751,7 +6057,280 @@
               <a:rPr sz="1800">
                 <a:latin typeface="Courier"/>
               </a:rPr>
-              <a:t>## Warning: Removed 6 rows containing missing values (geom_point).</a:t>
+              <a:t>BBall </a:t>
+            </a:r>
+            <a:r>
+              <a:rPr sz="1800">
+                <a:solidFill>
+                  <a:srgbClr val="666666"/>
+                </a:solidFill>
+                <a:latin typeface="Courier"/>
+              </a:rPr>
+              <a:t>%&gt;%</a:t>
+            </a:r>
+            <a:r>
+              <a:rPr sz="1800">
+                <a:solidFill>
+                  <a:srgbClr val="4070A0"/>
+                </a:solidFill>
+                <a:latin typeface="Courier"/>
+              </a:rPr>
+              <a:t> </a:t>
+            </a:r>
+            <a:r>
+              <a:rPr sz="1800" b="1">
+                <a:solidFill>
+                  <a:srgbClr val="007020"/>
+                </a:solidFill>
+                <a:latin typeface="Courier"/>
+              </a:rPr>
+              <a:t>filter</a:t>
+            </a:r>
+            <a:r>
+              <a:rPr sz="1800">
+                <a:latin typeface="Courier"/>
+              </a:rPr>
+              <a:t>(position </a:t>
+            </a:r>
+            <a:r>
+              <a:rPr sz="1800">
+                <a:solidFill>
+                  <a:srgbClr val="666666"/>
+                </a:solidFill>
+                <a:latin typeface="Courier"/>
+              </a:rPr>
+              <a:t>!=</a:t>
+            </a:r>
+            <a:r>
+              <a:rPr sz="1800">
+                <a:solidFill>
+                  <a:srgbClr val="4070A0"/>
+                </a:solidFill>
+                <a:latin typeface="Courier"/>
+              </a:rPr>
+              <a:t> ""</a:t>
+            </a:r>
+            <a:r>
+              <a:rPr sz="1800">
+                <a:latin typeface="Courier"/>
+              </a:rPr>
+              <a:t>) </a:t>
+            </a:r>
+            <a:r>
+              <a:rPr sz="1800">
+                <a:solidFill>
+                  <a:srgbClr val="666666"/>
+                </a:solidFill>
+                <a:latin typeface="Courier"/>
+              </a:rPr>
+              <a:t>%&gt;%</a:t>
+            </a:r>
+            <a:r>
+              <a:rPr sz="1800">
+                <a:solidFill>
+                  <a:srgbClr val="4070A0"/>
+                </a:solidFill>
+                <a:latin typeface="Courier"/>
+              </a:rPr>
+              <a:t> </a:t>
+            </a:r>
+            <a:r>
+              <a:rPr sz="1800" b="1">
+                <a:solidFill>
+                  <a:srgbClr val="007020"/>
+                </a:solidFill>
+                <a:latin typeface="Courier"/>
+              </a:rPr>
+              <a:t>ggplot</a:t>
+            </a:r>
+            <a:r>
+              <a:rPr sz="1800">
+                <a:latin typeface="Courier"/>
+              </a:rPr>
+              <a:t>(</a:t>
+            </a:r>
+            <a:r>
+              <a:rPr sz="1800" b="1">
+                <a:solidFill>
+                  <a:srgbClr val="007020"/>
+                </a:solidFill>
+                <a:latin typeface="Courier"/>
+              </a:rPr>
+              <a:t>aes</a:t>
+            </a:r>
+            <a:r>
+              <a:rPr sz="1800">
+                <a:latin typeface="Courier"/>
+              </a:rPr>
+              <a:t>(</a:t>
+            </a:r>
+            <a:r>
+              <a:rPr sz="1800">
+                <a:solidFill>
+                  <a:srgbClr val="902000"/>
+                </a:solidFill>
+                <a:latin typeface="Courier"/>
+              </a:rPr>
+              <a:t>x=</a:t>
+            </a:r>
+            <a:r>
+              <a:rPr sz="1800">
+                <a:latin typeface="Courier"/>
+              </a:rPr>
+              <a:t>height_inches)) </a:t>
+            </a:r>
+            <a:r>
+              <a:rPr sz="1800">
+                <a:solidFill>
+                  <a:srgbClr val="666666"/>
+                </a:solidFill>
+                <a:latin typeface="Courier"/>
+              </a:rPr>
+              <a:t>+</a:t>
+            </a:r>
+            <a:r>
+              <a:rPr sz="1800">
+                <a:solidFill>
+                  <a:srgbClr val="4070A0"/>
+                </a:solidFill>
+                <a:latin typeface="Courier"/>
+              </a:rPr>
+              <a:t> </a:t>
+            </a:r>
+            <a:r>
+              <a:rPr sz="1800" b="1">
+                <a:solidFill>
+                  <a:srgbClr val="007020"/>
+                </a:solidFill>
+                <a:latin typeface="Courier"/>
+              </a:rPr>
+              <a:t>geom_histogram</a:t>
+            </a:r>
+            <a:r>
+              <a:rPr sz="1800">
+                <a:latin typeface="Courier"/>
+              </a:rPr>
+              <a:t>(</a:t>
+            </a:r>
+            <a:r>
+              <a:rPr sz="1800">
+                <a:solidFill>
+                  <a:srgbClr val="902000"/>
+                </a:solidFill>
+                <a:latin typeface="Courier"/>
+              </a:rPr>
+              <a:t>bins=</a:t>
+            </a:r>
+            <a:r>
+              <a:rPr sz="1800">
+                <a:solidFill>
+                  <a:srgbClr val="40A070"/>
+                </a:solidFill>
+                <a:latin typeface="Courier"/>
+              </a:rPr>
+              <a:t>20</a:t>
+            </a:r>
+            <a:r>
+              <a:rPr sz="1800">
+                <a:latin typeface="Courier"/>
+              </a:rPr>
+              <a:t>) </a:t>
+            </a:r>
+            <a:r>
+              <a:rPr sz="1800">
+                <a:solidFill>
+                  <a:srgbClr val="666666"/>
+                </a:solidFill>
+                <a:latin typeface="Courier"/>
+              </a:rPr>
+              <a:t>+</a:t>
+            </a:r>
+            <a:r>
+              <a:rPr sz="1800">
+                <a:solidFill>
+                  <a:srgbClr val="4070A0"/>
+                </a:solidFill>
+                <a:latin typeface="Courier"/>
+              </a:rPr>
+              <a:t> </a:t>
+            </a:r>
+            <a:r>
+              <a:rPr sz="1800" b="1">
+                <a:solidFill>
+                  <a:srgbClr val="007020"/>
+                </a:solidFill>
+                <a:latin typeface="Courier"/>
+              </a:rPr>
+              <a:t>ggtitle</a:t>
+            </a:r>
+            <a:r>
+              <a:rPr sz="1800">
+                <a:latin typeface="Courier"/>
+              </a:rPr>
+              <a:t>(</a:t>
+            </a:r>
+            <a:r>
+              <a:rPr sz="1800">
+                <a:solidFill>
+                  <a:srgbClr val="4070A0"/>
+                </a:solidFill>
+                <a:latin typeface="Courier"/>
+              </a:rPr>
+              <a:t>"Distribution of Height for all positions"</a:t>
+            </a:r>
+            <a:r>
+              <a:rPr sz="1800">
+                <a:latin typeface="Courier"/>
+              </a:rPr>
+              <a:t>) </a:t>
+            </a:r>
+            <a:r>
+              <a:rPr sz="1800">
+                <a:solidFill>
+                  <a:srgbClr val="666666"/>
+                </a:solidFill>
+                <a:latin typeface="Courier"/>
+              </a:rPr>
+              <a:t>+</a:t>
+            </a:r>
+            <a:r>
+              <a:rPr sz="1800">
+                <a:solidFill>
+                  <a:srgbClr val="4070A0"/>
+                </a:solidFill>
+                <a:latin typeface="Courier"/>
+              </a:rPr>
+              <a:t> </a:t>
+            </a:r>
+            <a:r>
+              <a:rPr sz="1800" b="1">
+                <a:solidFill>
+                  <a:srgbClr val="007020"/>
+                </a:solidFill>
+                <a:latin typeface="Courier"/>
+              </a:rPr>
+              <a:t>facet_wrap</a:t>
+            </a:r>
+            <a:r>
+              <a:rPr sz="1800">
+                <a:latin typeface="Courier"/>
+              </a:rPr>
+              <a:t>(</a:t>
+            </a:r>
+            <a:r>
+              <a:rPr sz="1800">
+                <a:solidFill>
+                  <a:srgbClr val="666666"/>
+                </a:solidFill>
+                <a:latin typeface="Courier"/>
+              </a:rPr>
+              <a:t>~</a:t>
+            </a:r>
+            <a:r>
+              <a:rPr sz="1800">
+                <a:latin typeface="Courier"/>
+              </a:rPr>
+              <a:t>position)</a:t>
             </a:r>
           </a:p>
         </p:txBody>

</xml_diff>